<commit_message>
Module 2 slides and demos
</commit_message>
<xml_diff>
--- a/Slides/2 - Binding and Models.pptx
+++ b/Slides/2 - Binding and Models.pptx
@@ -5,22 +5,36 @@
     <p:sldMasterId id="2147483660" r:id="rId1"/>
   </p:sldMasterIdLst>
   <p:notesMasterIdLst>
-    <p:notesMasterId r:id="rId15"/>
+    <p:notesMasterId r:id="rId29"/>
   </p:notesMasterIdLst>
   <p:sldIdLst>
     <p:sldId id="451" r:id="rId2"/>
-    <p:sldId id="455" r:id="rId3"/>
+    <p:sldId id="475" r:id="rId3"/>
     <p:sldId id="463" r:id="rId4"/>
-    <p:sldId id="444" r:id="rId5"/>
-    <p:sldId id="464" r:id="rId6"/>
-    <p:sldId id="471" r:id="rId7"/>
-    <p:sldId id="465" r:id="rId8"/>
-    <p:sldId id="473" r:id="rId9"/>
-    <p:sldId id="474" r:id="rId10"/>
-    <p:sldId id="472" r:id="rId11"/>
-    <p:sldId id="466" r:id="rId12"/>
-    <p:sldId id="468" r:id="rId13"/>
-    <p:sldId id="450" r:id="rId14"/>
+    <p:sldId id="476" r:id="rId5"/>
+    <p:sldId id="444" r:id="rId6"/>
+    <p:sldId id="465" r:id="rId7"/>
+    <p:sldId id="477" r:id="rId8"/>
+    <p:sldId id="492" r:id="rId9"/>
+    <p:sldId id="478" r:id="rId10"/>
+    <p:sldId id="464" r:id="rId11"/>
+    <p:sldId id="479" r:id="rId12"/>
+    <p:sldId id="480" r:id="rId13"/>
+    <p:sldId id="482" r:id="rId14"/>
+    <p:sldId id="483" r:id="rId15"/>
+    <p:sldId id="484" r:id="rId16"/>
+    <p:sldId id="485" r:id="rId17"/>
+    <p:sldId id="486" r:id="rId18"/>
+    <p:sldId id="487" r:id="rId19"/>
+    <p:sldId id="481" r:id="rId20"/>
+    <p:sldId id="473" r:id="rId21"/>
+    <p:sldId id="488" r:id="rId22"/>
+    <p:sldId id="490" r:id="rId23"/>
+    <p:sldId id="491" r:id="rId24"/>
+    <p:sldId id="489" r:id="rId25"/>
+    <p:sldId id="493" r:id="rId26"/>
+    <p:sldId id="494" r:id="rId27"/>
+    <p:sldId id="450" r:id="rId28"/>
   </p:sldIdLst>
   <p:sldSz cx="12192000" cy="6858000"/>
   <p:notesSz cx="6858000" cy="9144000"/>
@@ -125,17 +139,31 @@
         <p14:section name="Default Section" id="{CD57A8B9-5C48-4AB5-93B7-EA7DD563D060}">
           <p14:sldIdLst>
             <p14:sldId id="451"/>
-            <p14:sldId id="455"/>
+            <p14:sldId id="475"/>
             <p14:sldId id="463"/>
+            <p14:sldId id="476"/>
             <p14:sldId id="444"/>
+            <p14:sldId id="465"/>
+            <p14:sldId id="477"/>
+            <p14:sldId id="492"/>
+            <p14:sldId id="478"/>
             <p14:sldId id="464"/>
-            <p14:sldId id="471"/>
-            <p14:sldId id="465"/>
+            <p14:sldId id="479"/>
+            <p14:sldId id="480"/>
+            <p14:sldId id="482"/>
+            <p14:sldId id="483"/>
+            <p14:sldId id="484"/>
+            <p14:sldId id="485"/>
+            <p14:sldId id="486"/>
+            <p14:sldId id="487"/>
+            <p14:sldId id="481"/>
             <p14:sldId id="473"/>
-            <p14:sldId id="474"/>
-            <p14:sldId id="472"/>
-            <p14:sldId id="466"/>
-            <p14:sldId id="468"/>
+            <p14:sldId id="488"/>
+            <p14:sldId id="490"/>
+            <p14:sldId id="491"/>
+            <p14:sldId id="489"/>
+            <p14:sldId id="493"/>
+            <p14:sldId id="494"/>
             <p14:sldId id="450"/>
           </p14:sldIdLst>
         </p14:section>
@@ -236,7 +264,7 @@
           <a:p>
             <a:fld id="{A9DDBD42-E139-45FA-9C16-1611187CAC3F}" type="datetimeFigureOut">
               <a:rPr lang="en-US" smtClean="0"/>
-              <a:t>9/5/2015</a:t>
+              <a:t>9/8/2015</a:t>
             </a:fld>
             <a:endParaRPr lang="en-US"/>
           </a:p>
@@ -657,19 +685,18 @@
           <a:bodyPr/>
           <a:lstStyle/>
           <a:p>
-            <a:fld id="{13F0F35F-DD44-4607-AEC1-49D7A4BC4066}" type="slidenum">
+            <a:fld id="{906AB01E-7BD7-442B-8A6B-D31FAFDAE830}" type="slidenum">
               <a:rPr lang="en-US" smtClean="0"/>
-              <a:pPr/>
-              <a:t>2</a:t>
+              <a:t>5</a:t>
             </a:fld>
-            <a:endParaRPr lang="en-US" dirty="0"/>
+            <a:endParaRPr lang="en-US"/>
           </a:p>
         </p:txBody>
       </p:sp>
     </p:spTree>
     <p:extLst>
       <p:ext uri="{BB962C8B-B14F-4D97-AF65-F5344CB8AC3E}">
-        <p14:creationId xmlns:p14="http://schemas.microsoft.com/office/powerpoint/2010/main" val="2981167769"/>
+        <p14:creationId xmlns:p14="http://schemas.microsoft.com/office/powerpoint/2010/main" val="1724137595"/>
       </p:ext>
     </p:extLst>
   </p:cSld>
@@ -744,175 +771,7 @@
           <a:p>
             <a:fld id="{906AB01E-7BD7-442B-8A6B-D31FAFDAE830}" type="slidenum">
               <a:rPr lang="en-US" smtClean="0"/>
-              <a:t>4</a:t>
-            </a:fld>
-            <a:endParaRPr lang="en-US"/>
-          </a:p>
-        </p:txBody>
-      </p:sp>
-    </p:spTree>
-    <p:extLst>
-      <p:ext uri="{BB962C8B-B14F-4D97-AF65-F5344CB8AC3E}">
-        <p14:creationId xmlns:p14="http://schemas.microsoft.com/office/powerpoint/2010/main" val="1724137595"/>
-      </p:ext>
-    </p:extLst>
-  </p:cSld>
-  <p:clrMapOvr>
-    <a:masterClrMapping/>
-  </p:clrMapOvr>
-</p:notes>
-</file>
-
-<file path=ppt/notesSlides/notesSlide4.xml><?xml version="1.0" encoding="utf-8"?>
-<p:notes xmlns:a="http://schemas.openxmlformats.org/drawingml/2006/main" xmlns:r="http://schemas.openxmlformats.org/officeDocument/2006/relationships" xmlns:p="http://schemas.openxmlformats.org/presentationml/2006/main">
-  <p:cSld>
-    <p:spTree>
-      <p:nvGrpSpPr>
-        <p:cNvPr id="1" name=""/>
-        <p:cNvGrpSpPr/>
-        <p:nvPr/>
-      </p:nvGrpSpPr>
-      <p:grpSpPr>
-        <a:xfrm>
-          <a:off x="0" y="0"/>
-          <a:ext cx="0" cy="0"/>
-          <a:chOff x="0" y="0"/>
-          <a:chExt cx="0" cy="0"/>
-        </a:xfrm>
-      </p:grpSpPr>
-      <p:sp>
-        <p:nvSpPr>
-          <p:cNvPr id="2" name="Slide Image Placeholder 1"/>
-          <p:cNvSpPr>
-            <a:spLocks noGrp="1" noRot="1" noChangeAspect="1"/>
-          </p:cNvSpPr>
-          <p:nvPr>
-            <p:ph type="sldImg"/>
-          </p:nvPr>
-        </p:nvSpPr>
-        <p:spPr/>
-      </p:sp>
-      <p:sp>
-        <p:nvSpPr>
-          <p:cNvPr id="3" name="Notes Placeholder 2"/>
-          <p:cNvSpPr>
-            <a:spLocks noGrp="1"/>
-          </p:cNvSpPr>
-          <p:nvPr>
-            <p:ph type="body" idx="1"/>
-          </p:nvPr>
-        </p:nvSpPr>
-        <p:spPr/>
-        <p:txBody>
-          <a:bodyPr/>
-          <a:lstStyle/>
-          <a:p>
-            <a:endParaRPr lang="en-US" dirty="0"/>
-          </a:p>
-        </p:txBody>
-      </p:sp>
-      <p:sp>
-        <p:nvSpPr>
-          <p:cNvPr id="4" name="Slide Number Placeholder 3"/>
-          <p:cNvSpPr>
-            <a:spLocks noGrp="1"/>
-          </p:cNvSpPr>
-          <p:nvPr>
-            <p:ph type="sldNum" sz="quarter" idx="10"/>
-          </p:nvPr>
-        </p:nvSpPr>
-        <p:spPr/>
-        <p:txBody>
-          <a:bodyPr/>
-          <a:lstStyle/>
-          <a:p>
-            <a:fld id="{906AB01E-7BD7-442B-8A6B-D31FAFDAE830}" type="slidenum">
-              <a:rPr lang="en-US" smtClean="0"/>
-              <a:t>6</a:t>
-            </a:fld>
-            <a:endParaRPr lang="en-US"/>
-          </a:p>
-        </p:txBody>
-      </p:sp>
-    </p:spTree>
-    <p:extLst>
-      <p:ext uri="{BB962C8B-B14F-4D97-AF65-F5344CB8AC3E}">
-        <p14:creationId xmlns:p14="http://schemas.microsoft.com/office/powerpoint/2010/main" val="4260907765"/>
-      </p:ext>
-    </p:extLst>
-  </p:cSld>
-  <p:clrMapOvr>
-    <a:masterClrMapping/>
-  </p:clrMapOvr>
-</p:notes>
-</file>
-
-<file path=ppt/notesSlides/notesSlide5.xml><?xml version="1.0" encoding="utf-8"?>
-<p:notes xmlns:a="http://schemas.openxmlformats.org/drawingml/2006/main" xmlns:r="http://schemas.openxmlformats.org/officeDocument/2006/relationships" xmlns:p="http://schemas.openxmlformats.org/presentationml/2006/main">
-  <p:cSld>
-    <p:spTree>
-      <p:nvGrpSpPr>
-        <p:cNvPr id="1" name=""/>
-        <p:cNvGrpSpPr/>
-        <p:nvPr/>
-      </p:nvGrpSpPr>
-      <p:grpSpPr>
-        <a:xfrm>
-          <a:off x="0" y="0"/>
-          <a:ext cx="0" cy="0"/>
-          <a:chOff x="0" y="0"/>
-          <a:chExt cx="0" cy="0"/>
-        </a:xfrm>
-      </p:grpSpPr>
-      <p:sp>
-        <p:nvSpPr>
-          <p:cNvPr id="2" name="Slide Image Placeholder 1"/>
-          <p:cNvSpPr>
-            <a:spLocks noGrp="1" noRot="1" noChangeAspect="1"/>
-          </p:cNvSpPr>
-          <p:nvPr>
-            <p:ph type="sldImg"/>
-          </p:nvPr>
-        </p:nvSpPr>
-        <p:spPr/>
-      </p:sp>
-      <p:sp>
-        <p:nvSpPr>
-          <p:cNvPr id="3" name="Notes Placeholder 2"/>
-          <p:cNvSpPr>
-            <a:spLocks noGrp="1"/>
-          </p:cNvSpPr>
-          <p:nvPr>
-            <p:ph type="body" idx="1"/>
-          </p:nvPr>
-        </p:nvSpPr>
-        <p:spPr/>
-        <p:txBody>
-          <a:bodyPr/>
-          <a:lstStyle/>
-          <a:p>
-            <a:endParaRPr lang="en-US" dirty="0"/>
-          </a:p>
-        </p:txBody>
-      </p:sp>
-      <p:sp>
-        <p:nvSpPr>
-          <p:cNvPr id="4" name="Slide Number Placeholder 3"/>
-          <p:cNvSpPr>
-            <a:spLocks noGrp="1"/>
-          </p:cNvSpPr>
-          <p:nvPr>
-            <p:ph type="sldNum" sz="quarter" idx="10"/>
-          </p:nvPr>
-        </p:nvSpPr>
-        <p:spPr/>
-        <p:txBody>
-          <a:bodyPr/>
-          <a:lstStyle/>
-          <a:p>
-            <a:fld id="{906AB01E-7BD7-442B-8A6B-D31FAFDAE830}" type="slidenum">
-              <a:rPr lang="en-US" smtClean="0"/>
-              <a:t>8</a:t>
+              <a:t>20</a:t>
             </a:fld>
             <a:endParaRPr lang="en-US"/>
           </a:p>
@@ -922,174 +781,6 @@
     <p:extLst>
       <p:ext uri="{BB962C8B-B14F-4D97-AF65-F5344CB8AC3E}">
         <p14:creationId xmlns:p14="http://schemas.microsoft.com/office/powerpoint/2010/main" val="3780135897"/>
-      </p:ext>
-    </p:extLst>
-  </p:cSld>
-  <p:clrMapOvr>
-    <a:masterClrMapping/>
-  </p:clrMapOvr>
-</p:notes>
-</file>
-
-<file path=ppt/notesSlides/notesSlide6.xml><?xml version="1.0" encoding="utf-8"?>
-<p:notes xmlns:a="http://schemas.openxmlformats.org/drawingml/2006/main" xmlns:r="http://schemas.openxmlformats.org/officeDocument/2006/relationships" xmlns:p="http://schemas.openxmlformats.org/presentationml/2006/main">
-  <p:cSld>
-    <p:spTree>
-      <p:nvGrpSpPr>
-        <p:cNvPr id="1" name=""/>
-        <p:cNvGrpSpPr/>
-        <p:nvPr/>
-      </p:nvGrpSpPr>
-      <p:grpSpPr>
-        <a:xfrm>
-          <a:off x="0" y="0"/>
-          <a:ext cx="0" cy="0"/>
-          <a:chOff x="0" y="0"/>
-          <a:chExt cx="0" cy="0"/>
-        </a:xfrm>
-      </p:grpSpPr>
-      <p:sp>
-        <p:nvSpPr>
-          <p:cNvPr id="2" name="Slide Image Placeholder 1"/>
-          <p:cNvSpPr>
-            <a:spLocks noGrp="1" noRot="1" noChangeAspect="1"/>
-          </p:cNvSpPr>
-          <p:nvPr>
-            <p:ph type="sldImg"/>
-          </p:nvPr>
-        </p:nvSpPr>
-        <p:spPr/>
-      </p:sp>
-      <p:sp>
-        <p:nvSpPr>
-          <p:cNvPr id="3" name="Notes Placeholder 2"/>
-          <p:cNvSpPr>
-            <a:spLocks noGrp="1"/>
-          </p:cNvSpPr>
-          <p:nvPr>
-            <p:ph type="body" idx="1"/>
-          </p:nvPr>
-        </p:nvSpPr>
-        <p:spPr/>
-        <p:txBody>
-          <a:bodyPr/>
-          <a:lstStyle/>
-          <a:p>
-            <a:endParaRPr lang="en-US" dirty="0"/>
-          </a:p>
-        </p:txBody>
-      </p:sp>
-      <p:sp>
-        <p:nvSpPr>
-          <p:cNvPr id="4" name="Slide Number Placeholder 3"/>
-          <p:cNvSpPr>
-            <a:spLocks noGrp="1"/>
-          </p:cNvSpPr>
-          <p:nvPr>
-            <p:ph type="sldNum" sz="quarter" idx="10"/>
-          </p:nvPr>
-        </p:nvSpPr>
-        <p:spPr/>
-        <p:txBody>
-          <a:bodyPr/>
-          <a:lstStyle/>
-          <a:p>
-            <a:fld id="{906AB01E-7BD7-442B-8A6B-D31FAFDAE830}" type="slidenum">
-              <a:rPr lang="en-US" smtClean="0"/>
-              <a:t>10</a:t>
-            </a:fld>
-            <a:endParaRPr lang="en-US"/>
-          </a:p>
-        </p:txBody>
-      </p:sp>
-    </p:spTree>
-    <p:extLst>
-      <p:ext uri="{BB962C8B-B14F-4D97-AF65-F5344CB8AC3E}">
-        <p14:creationId xmlns:p14="http://schemas.microsoft.com/office/powerpoint/2010/main" val="645433611"/>
-      </p:ext>
-    </p:extLst>
-  </p:cSld>
-  <p:clrMapOvr>
-    <a:masterClrMapping/>
-  </p:clrMapOvr>
-</p:notes>
-</file>
-
-<file path=ppt/notesSlides/notesSlide7.xml><?xml version="1.0" encoding="utf-8"?>
-<p:notes xmlns:a="http://schemas.openxmlformats.org/drawingml/2006/main" xmlns:r="http://schemas.openxmlformats.org/officeDocument/2006/relationships" xmlns:p="http://schemas.openxmlformats.org/presentationml/2006/main">
-  <p:cSld>
-    <p:spTree>
-      <p:nvGrpSpPr>
-        <p:cNvPr id="1" name=""/>
-        <p:cNvGrpSpPr/>
-        <p:nvPr/>
-      </p:nvGrpSpPr>
-      <p:grpSpPr>
-        <a:xfrm>
-          <a:off x="0" y="0"/>
-          <a:ext cx="0" cy="0"/>
-          <a:chOff x="0" y="0"/>
-          <a:chExt cx="0" cy="0"/>
-        </a:xfrm>
-      </p:grpSpPr>
-      <p:sp>
-        <p:nvSpPr>
-          <p:cNvPr id="2" name="Slide Image Placeholder 1"/>
-          <p:cNvSpPr>
-            <a:spLocks noGrp="1" noRot="1" noChangeAspect="1"/>
-          </p:cNvSpPr>
-          <p:nvPr>
-            <p:ph type="sldImg"/>
-          </p:nvPr>
-        </p:nvSpPr>
-        <p:spPr/>
-      </p:sp>
-      <p:sp>
-        <p:nvSpPr>
-          <p:cNvPr id="3" name="Notes Placeholder 2"/>
-          <p:cNvSpPr>
-            <a:spLocks noGrp="1"/>
-          </p:cNvSpPr>
-          <p:nvPr>
-            <p:ph type="body" idx="1"/>
-          </p:nvPr>
-        </p:nvSpPr>
-        <p:spPr/>
-        <p:txBody>
-          <a:bodyPr/>
-          <a:lstStyle/>
-          <a:p>
-            <a:endParaRPr lang="en-US" dirty="0"/>
-          </a:p>
-        </p:txBody>
-      </p:sp>
-      <p:sp>
-        <p:nvSpPr>
-          <p:cNvPr id="4" name="Slide Number Placeholder 3"/>
-          <p:cNvSpPr>
-            <a:spLocks noGrp="1"/>
-          </p:cNvSpPr>
-          <p:nvPr>
-            <p:ph type="sldNum" sz="quarter" idx="10"/>
-          </p:nvPr>
-        </p:nvSpPr>
-        <p:spPr/>
-        <p:txBody>
-          <a:bodyPr/>
-          <a:lstStyle/>
-          <a:p>
-            <a:fld id="{906AB01E-7BD7-442B-8A6B-D31FAFDAE830}" type="slidenum">
-              <a:rPr lang="en-US" smtClean="0"/>
-              <a:t>12</a:t>
-            </a:fld>
-            <a:endParaRPr lang="en-US"/>
-          </a:p>
-        </p:txBody>
-      </p:sp>
-    </p:spTree>
-    <p:extLst>
-      <p:ext uri="{BB962C8B-B14F-4D97-AF65-F5344CB8AC3E}">
-        <p14:creationId xmlns:p14="http://schemas.microsoft.com/office/powerpoint/2010/main" val="3414845990"/>
       </p:ext>
     </p:extLst>
   </p:cSld>
@@ -3749,7 +3440,7 @@
           <a:p>
             <a:r>
               <a:rPr lang="en-US" sz="4000" dirty="0" smtClean="0"/>
-              <a:t>Binding and Models</a:t>
+              <a:t>Models and bindings</a:t>
             </a:r>
             <a:endParaRPr lang="en-US" sz="4000" dirty="0"/>
           </a:p>
@@ -3794,12 +3485,12 @@
       </p:grpSpPr>
       <p:sp>
         <p:nvSpPr>
-          <p:cNvPr id="5" name="Title 4"/>
-          <p:cNvSpPr>
-            <a:spLocks noGrp="1"/>
-          </p:cNvSpPr>
-          <p:nvPr>
-            <p:ph type="title"/>
+          <p:cNvPr id="2" name="Text Placeholder 1"/>
+          <p:cNvSpPr>
+            <a:spLocks noGrp="1"/>
+          </p:cNvSpPr>
+          <p:nvPr>
+            <p:ph type="body" sz="quarter" idx="10"/>
           </p:nvPr>
         </p:nvSpPr>
         <p:spPr/>
@@ -3808,17 +3499,36 @@
           <a:lstStyle/>
           <a:p>
             <a:r>
-              <a:rPr lang="en-CA" dirty="0" smtClean="0"/>
-              <a:t>Two-way Bindings</a:t>
+              <a:rPr lang="en-US" dirty="0" smtClean="0"/>
+              <a:t>Observables and two way binding</a:t>
             </a:r>
             <a:endParaRPr lang="en-US" dirty="0"/>
+          </a:p>
+        </p:txBody>
+      </p:sp>
+      <p:sp>
+        <p:nvSpPr>
+          <p:cNvPr id="3" name="Subtitle 2"/>
+          <p:cNvSpPr>
+            <a:spLocks noGrp="1"/>
+          </p:cNvSpPr>
+          <p:nvPr>
+            <p:ph type="subTitle" idx="1"/>
+          </p:nvPr>
+        </p:nvSpPr>
+        <p:spPr/>
+        <p:txBody>
+          <a:bodyPr/>
+          <a:lstStyle/>
+          <a:p>
+            <a:endParaRPr lang="en-US"/>
           </a:p>
         </p:txBody>
       </p:sp>
     </p:spTree>
     <p:extLst>
       <p:ext uri="{BB962C8B-B14F-4D97-AF65-F5344CB8AC3E}">
-        <p14:creationId xmlns:p14="http://schemas.microsoft.com/office/powerpoint/2010/main" val="1016257650"/>
+        <p14:creationId xmlns:p14="http://schemas.microsoft.com/office/powerpoint/2010/main" val="2875753425"/>
       </p:ext>
     </p:extLst>
   </p:cSld>
@@ -3854,12 +3564,12 @@
       </p:grpSpPr>
       <p:sp>
         <p:nvSpPr>
-          <p:cNvPr id="2" name="Text Placeholder 1"/>
-          <p:cNvSpPr>
-            <a:spLocks noGrp="1"/>
-          </p:cNvSpPr>
-          <p:nvPr>
-            <p:ph type="body" sz="quarter" idx="10"/>
+          <p:cNvPr id="4" name="Title 3"/>
+          <p:cNvSpPr>
+            <a:spLocks noGrp="1"/>
+          </p:cNvSpPr>
+          <p:nvPr>
+            <p:ph type="title"/>
           </p:nvPr>
         </p:nvSpPr>
         <p:spPr/>
@@ -3869,7 +3579,7 @@
           <a:p>
             <a:r>
               <a:rPr lang="en-US" dirty="0" smtClean="0"/>
-              <a:t>Custom Bindings</a:t>
+              <a:t>Observables</a:t>
             </a:r>
             <a:endParaRPr lang="en-US" dirty="0"/>
           </a:p>
@@ -3877,12 +3587,12 @@
       </p:sp>
       <p:sp>
         <p:nvSpPr>
-          <p:cNvPr id="3" name="Subtitle 2"/>
-          <p:cNvSpPr>
-            <a:spLocks noGrp="1"/>
-          </p:cNvSpPr>
-          <p:nvPr>
-            <p:ph type="subTitle" idx="1"/>
+          <p:cNvPr id="5" name="Content Placeholder 4"/>
+          <p:cNvSpPr>
+            <a:spLocks noGrp="1"/>
+          </p:cNvSpPr>
+          <p:nvPr>
+            <p:ph sz="quarter" idx="10"/>
           </p:nvPr>
         </p:nvSpPr>
         <p:spPr/>
@@ -3890,27 +3600,84 @@
           <a:bodyPr/>
           <a:lstStyle/>
           <a:p>
-            <a:endParaRPr lang="en-US"/>
-          </a:p>
-        </p:txBody>
-      </p:sp>
+            <a:r>
+              <a:rPr lang="en-US" dirty="0" smtClean="0"/>
+              <a:t>Values may change</a:t>
+            </a:r>
+          </a:p>
+          <a:p>
+            <a:r>
+              <a:rPr lang="en-US" dirty="0" smtClean="0"/>
+              <a:t>Knockout provides the ability to update us when those values change through observables</a:t>
+            </a:r>
+            <a:endParaRPr lang="en-US" dirty="0"/>
+          </a:p>
+        </p:txBody>
+      </p:sp>
+      <mc:AlternateContent xmlns:mc="http://schemas.openxmlformats.org/markup-compatibility/2006" xmlns:we="http://schemas.microsoft.com/office/webextensions/webextension/2010/11" xmlns:pca="http://schemas.microsoft.com/office/powerpoint/2013/contentapp">
+        <mc:Choice Requires="we pca">
+          <p:graphicFrame>
+            <p:nvGraphicFramePr>
+              <p:cNvPr id="6" name="Add-in 5" title="Code Presenter Pro"/>
+              <p:cNvGraphicFramePr>
+                <a:graphicFrameLocks noGrp="1"/>
+              </p:cNvGraphicFramePr>
+              <p:nvPr>
+                <p:extLst>
+                  <p:ext uri="{D42A27DB-BD31-4B8C-83A1-F6EECF244321}">
+                    <p14:modId xmlns:p14="http://schemas.microsoft.com/office/powerpoint/2010/main" val="1094282422"/>
+                  </p:ext>
+                </p:extLst>
+              </p:nvPr>
+            </p:nvGraphicFramePr>
+            <p:xfrm>
+              <a:off x="1" y="3872752"/>
+              <a:ext cx="12192000" cy="2985247"/>
+            </p:xfrm>
+            <a:graphic>
+              <a:graphicData uri="http://schemas.microsoft.com/office/webextensions/webextension/2010/11">
+                <we:webextensionref xmlns:we="http://schemas.microsoft.com/office/webextensions/webextension/2010/11" xmlns:r="http://schemas.openxmlformats.org/officeDocument/2006/relationships" r:id="rId2"/>
+              </a:graphicData>
+            </a:graphic>
+          </p:graphicFrame>
+        </mc:Choice>
+        <mc:Fallback xmlns="">
+          <p:pic>
+            <p:nvPicPr>
+              <p:cNvPr id="6" name="Add-in 5" title="Code Presenter Pro"/>
+              <p:cNvPicPr>
+                <a:picLocks noGrp="1" noRot="1" noChangeAspect="1" noMove="1" noResize="1" noEditPoints="1" noAdjustHandles="1" noChangeArrowheads="1" noChangeShapeType="1"/>
+              </p:cNvPicPr>
+              <p:nvPr/>
+            </p:nvPicPr>
+            <p:blipFill>
+              <a:blip r:embed="rId3"/>
+              <a:stretch>
+                <a:fillRect/>
+              </a:stretch>
+            </p:blipFill>
+            <p:spPr>
+              <a:xfrm>
+                <a:off x="1" y="3872752"/>
+                <a:ext cx="12192000" cy="2985247"/>
+              </a:xfrm>
+              <a:prstGeom prst="rect">
+                <a:avLst/>
+              </a:prstGeom>
+            </p:spPr>
+          </p:pic>
+        </mc:Fallback>
+      </mc:AlternateContent>
     </p:spTree>
     <p:extLst>
       <p:ext uri="{BB962C8B-B14F-4D97-AF65-F5344CB8AC3E}">
-        <p14:creationId xmlns:p14="http://schemas.microsoft.com/office/powerpoint/2010/main" val="1706519822"/>
+        <p14:creationId xmlns:p14="http://schemas.microsoft.com/office/powerpoint/2010/main" val="1498641851"/>
       </p:ext>
     </p:extLst>
   </p:cSld>
   <p:clrMapOvr>
     <a:masterClrMapping/>
   </p:clrMapOvr>
-  <p:timing>
-    <p:tnLst>
-      <p:par>
-        <p:cTn id="1" dur="indefinite" restart="never" nodeType="tmRoot"/>
-      </p:par>
-    </p:tnLst>
-  </p:timing>
 </p:sld>
 </file>
 
@@ -3933,7 +3700,7 @@
       </p:grpSpPr>
       <p:sp>
         <p:nvSpPr>
-          <p:cNvPr id="5" name="Title 4"/>
+          <p:cNvPr id="4" name="Title 3"/>
           <p:cNvSpPr>
             <a:spLocks noGrp="1"/>
           </p:cNvSpPr>
@@ -3947,8 +3714,8 @@
           <a:lstStyle/>
           <a:p>
             <a:r>
-              <a:rPr lang="en-CA" dirty="0" smtClean="0"/>
-              <a:t>Custom Bindings</a:t>
+              <a:rPr lang="en-US" dirty="0" smtClean="0"/>
+              <a:t>Two way bindings with observables</a:t>
             </a:r>
             <a:endParaRPr lang="en-US" dirty="0"/>
           </a:p>
@@ -3957,7 +3724,968 @@
     </p:spTree>
     <p:extLst>
       <p:ext uri="{BB962C8B-B14F-4D97-AF65-F5344CB8AC3E}">
-        <p14:creationId xmlns:p14="http://schemas.microsoft.com/office/powerpoint/2010/main" val="461796257"/>
+        <p14:creationId xmlns:p14="http://schemas.microsoft.com/office/powerpoint/2010/main" val="4134744456"/>
+      </p:ext>
+    </p:extLst>
+  </p:cSld>
+  <p:clrMapOvr>
+    <a:masterClrMapping/>
+  </p:clrMapOvr>
+</p:sld>
+</file>
+
+<file path=ppt/slides/slide13.xml><?xml version="1.0" encoding="utf-8"?>
+<p:sld xmlns:a="http://schemas.openxmlformats.org/drawingml/2006/main" xmlns:r="http://schemas.openxmlformats.org/officeDocument/2006/relationships" xmlns:p="http://schemas.openxmlformats.org/presentationml/2006/main">
+  <p:cSld>
+    <p:spTree>
+      <p:nvGrpSpPr>
+        <p:cNvPr id="1" name=""/>
+        <p:cNvGrpSpPr/>
+        <p:nvPr/>
+      </p:nvGrpSpPr>
+      <p:grpSpPr>
+        <a:xfrm>
+          <a:off x="0" y="0"/>
+          <a:ext cx="0" cy="0"/>
+          <a:chOff x="0" y="0"/>
+          <a:chExt cx="0" cy="0"/>
+        </a:xfrm>
+      </p:grpSpPr>
+      <p:sp>
+        <p:nvSpPr>
+          <p:cNvPr id="4" name="Text Placeholder 3"/>
+          <p:cNvSpPr>
+            <a:spLocks noGrp="1"/>
+          </p:cNvSpPr>
+          <p:nvPr>
+            <p:ph type="body" sz="quarter" idx="10"/>
+          </p:nvPr>
+        </p:nvSpPr>
+        <p:spPr/>
+        <p:txBody>
+          <a:bodyPr/>
+          <a:lstStyle/>
+          <a:p>
+            <a:r>
+              <a:rPr lang="en-US" dirty="0" smtClean="0"/>
+              <a:t>Computed observables</a:t>
+            </a:r>
+            <a:endParaRPr lang="en-US" dirty="0"/>
+          </a:p>
+        </p:txBody>
+      </p:sp>
+      <p:sp>
+        <p:nvSpPr>
+          <p:cNvPr id="3" name="Subtitle 2"/>
+          <p:cNvSpPr>
+            <a:spLocks noGrp="1"/>
+          </p:cNvSpPr>
+          <p:nvPr>
+            <p:ph type="subTitle" idx="1"/>
+          </p:nvPr>
+        </p:nvSpPr>
+        <p:spPr/>
+        <p:txBody>
+          <a:bodyPr/>
+          <a:lstStyle/>
+          <a:p>
+            <a:endParaRPr lang="en-US" dirty="0"/>
+          </a:p>
+        </p:txBody>
+      </p:sp>
+    </p:spTree>
+    <p:extLst>
+      <p:ext uri="{BB962C8B-B14F-4D97-AF65-F5344CB8AC3E}">
+        <p14:creationId xmlns:p14="http://schemas.microsoft.com/office/powerpoint/2010/main" val="3187367478"/>
+      </p:ext>
+    </p:extLst>
+  </p:cSld>
+  <p:clrMapOvr>
+    <a:masterClrMapping/>
+  </p:clrMapOvr>
+</p:sld>
+</file>
+
+<file path=ppt/slides/slide14.xml><?xml version="1.0" encoding="utf-8"?>
+<p:sld xmlns:a="http://schemas.openxmlformats.org/drawingml/2006/main" xmlns:r="http://schemas.openxmlformats.org/officeDocument/2006/relationships" xmlns:p="http://schemas.openxmlformats.org/presentationml/2006/main">
+  <p:cSld>
+    <p:spTree>
+      <p:nvGrpSpPr>
+        <p:cNvPr id="1" name=""/>
+        <p:cNvGrpSpPr/>
+        <p:nvPr/>
+      </p:nvGrpSpPr>
+      <p:grpSpPr>
+        <a:xfrm>
+          <a:off x="0" y="0"/>
+          <a:ext cx="0" cy="0"/>
+          <a:chOff x="0" y="0"/>
+          <a:chExt cx="0" cy="0"/>
+        </a:xfrm>
+      </p:grpSpPr>
+      <p:sp>
+        <p:nvSpPr>
+          <p:cNvPr id="4" name="Title 3"/>
+          <p:cNvSpPr>
+            <a:spLocks noGrp="1"/>
+          </p:cNvSpPr>
+          <p:nvPr>
+            <p:ph type="title"/>
+          </p:nvPr>
+        </p:nvSpPr>
+        <p:spPr/>
+        <p:txBody>
+          <a:bodyPr/>
+          <a:lstStyle/>
+          <a:p>
+            <a:r>
+              <a:rPr lang="en-US" dirty="0" smtClean="0"/>
+              <a:t>Sometimes, we need to perform a calculation</a:t>
+            </a:r>
+            <a:endParaRPr lang="en-US" dirty="0"/>
+          </a:p>
+        </p:txBody>
+      </p:sp>
+      <p:sp>
+        <p:nvSpPr>
+          <p:cNvPr id="5" name="Content Placeholder 4"/>
+          <p:cNvSpPr>
+            <a:spLocks noGrp="1"/>
+          </p:cNvSpPr>
+          <p:nvPr>
+            <p:ph sz="quarter" idx="10"/>
+          </p:nvPr>
+        </p:nvSpPr>
+        <p:spPr/>
+        <p:txBody>
+          <a:bodyPr/>
+          <a:lstStyle/>
+          <a:p>
+            <a:r>
+              <a:rPr lang="en-US" dirty="0" smtClean="0"/>
+              <a:t>Show a project is past due</a:t>
+            </a:r>
+          </a:p>
+          <a:p>
+            <a:r>
+              <a:rPr lang="en-US" dirty="0" smtClean="0"/>
+              <a:t>Provide simpler data for view, such as full name</a:t>
+            </a:r>
+            <a:endParaRPr lang="en-US" dirty="0"/>
+          </a:p>
+        </p:txBody>
+      </p:sp>
+    </p:spTree>
+    <p:extLst>
+      <p:ext uri="{BB962C8B-B14F-4D97-AF65-F5344CB8AC3E}">
+        <p14:creationId xmlns:p14="http://schemas.microsoft.com/office/powerpoint/2010/main" val="4009043184"/>
+      </p:ext>
+    </p:extLst>
+  </p:cSld>
+  <p:clrMapOvr>
+    <a:masterClrMapping/>
+  </p:clrMapOvr>
+</p:sld>
+</file>
+
+<file path=ppt/slides/slide15.xml><?xml version="1.0" encoding="utf-8"?>
+<p:sld xmlns:a="http://schemas.openxmlformats.org/drawingml/2006/main" xmlns:r="http://schemas.openxmlformats.org/officeDocument/2006/relationships" xmlns:p="http://schemas.openxmlformats.org/presentationml/2006/main">
+  <p:cSld>
+    <p:spTree>
+      <p:nvGrpSpPr>
+        <p:cNvPr id="1" name=""/>
+        <p:cNvGrpSpPr/>
+        <p:nvPr/>
+      </p:nvGrpSpPr>
+      <p:grpSpPr>
+        <a:xfrm>
+          <a:off x="0" y="0"/>
+          <a:ext cx="0" cy="0"/>
+          <a:chOff x="0" y="0"/>
+          <a:chExt cx="0" cy="0"/>
+        </a:xfrm>
+      </p:grpSpPr>
+      <p:sp>
+        <p:nvSpPr>
+          <p:cNvPr id="2" name="Title 1"/>
+          <p:cNvSpPr>
+            <a:spLocks noGrp="1"/>
+          </p:cNvSpPr>
+          <p:nvPr>
+            <p:ph type="title"/>
+          </p:nvPr>
+        </p:nvSpPr>
+        <p:spPr/>
+        <p:txBody>
+          <a:bodyPr/>
+          <a:lstStyle/>
+          <a:p>
+            <a:r>
+              <a:rPr lang="en-US" dirty="0" smtClean="0"/>
+              <a:t>Knockout provides two types of calculations</a:t>
+            </a:r>
+            <a:endParaRPr lang="en-US" dirty="0"/>
+          </a:p>
+        </p:txBody>
+      </p:sp>
+      <p:sp>
+        <p:nvSpPr>
+          <p:cNvPr id="3" name="Content Placeholder 2"/>
+          <p:cNvSpPr>
+            <a:spLocks noGrp="1"/>
+          </p:cNvSpPr>
+          <p:nvPr>
+            <p:ph sz="quarter" idx="10"/>
+          </p:nvPr>
+        </p:nvSpPr>
+        <p:spPr/>
+        <p:txBody>
+          <a:bodyPr/>
+          <a:lstStyle/>
+          <a:p>
+            <a:r>
+              <a:rPr lang="en-US" dirty="0" smtClean="0"/>
+              <a:t>computed</a:t>
+            </a:r>
+          </a:p>
+          <a:p>
+            <a:pPr lvl="1"/>
+            <a:r>
+              <a:rPr lang="en-US" dirty="0" smtClean="0"/>
+              <a:t>Basic calculation</a:t>
+            </a:r>
+          </a:p>
+          <a:p>
+            <a:pPr lvl="1"/>
+            <a:r>
+              <a:rPr lang="en-US" dirty="0" smtClean="0"/>
+              <a:t>Might have “side effects” (change the data)</a:t>
+            </a:r>
+          </a:p>
+          <a:p>
+            <a:r>
+              <a:rPr lang="en-US" dirty="0" err="1" smtClean="0"/>
+              <a:t>pureComputed</a:t>
+            </a:r>
+            <a:endParaRPr lang="en-US" dirty="0" smtClean="0"/>
+          </a:p>
+          <a:p>
+            <a:pPr lvl="1"/>
+            <a:r>
+              <a:rPr lang="en-US" dirty="0" smtClean="0"/>
+              <a:t>Basic calculation</a:t>
+            </a:r>
+          </a:p>
+          <a:p>
+            <a:pPr lvl="1"/>
+            <a:r>
+              <a:rPr lang="en-US" dirty="0" smtClean="0"/>
+              <a:t>No side effects</a:t>
+            </a:r>
+          </a:p>
+          <a:p>
+            <a:pPr lvl="1"/>
+            <a:r>
+              <a:rPr lang="en-US" dirty="0" smtClean="0"/>
+              <a:t>Better performance</a:t>
+            </a:r>
+          </a:p>
+          <a:p>
+            <a:pPr lvl="1"/>
+            <a:r>
+              <a:rPr lang="en-US" dirty="0" smtClean="0"/>
+              <a:t>Typically what you want to use</a:t>
+            </a:r>
+            <a:endParaRPr lang="en-US" dirty="0"/>
+          </a:p>
+        </p:txBody>
+      </p:sp>
+    </p:spTree>
+    <p:extLst>
+      <p:ext uri="{BB962C8B-B14F-4D97-AF65-F5344CB8AC3E}">
+        <p14:creationId xmlns:p14="http://schemas.microsoft.com/office/powerpoint/2010/main" val="2322341508"/>
+      </p:ext>
+    </p:extLst>
+  </p:cSld>
+  <p:clrMapOvr>
+    <a:masterClrMapping/>
+  </p:clrMapOvr>
+</p:sld>
+</file>
+
+<file path=ppt/slides/slide16.xml><?xml version="1.0" encoding="utf-8"?>
+<p:sld xmlns:a="http://schemas.openxmlformats.org/drawingml/2006/main" xmlns:r="http://schemas.openxmlformats.org/officeDocument/2006/relationships" xmlns:p="http://schemas.openxmlformats.org/presentationml/2006/main">
+  <p:cSld>
+    <p:spTree>
+      <p:nvGrpSpPr>
+        <p:cNvPr id="1" name=""/>
+        <p:cNvGrpSpPr/>
+        <p:nvPr/>
+      </p:nvGrpSpPr>
+      <p:grpSpPr>
+        <a:xfrm>
+          <a:off x="0" y="0"/>
+          <a:ext cx="0" cy="0"/>
+          <a:chOff x="0" y="0"/>
+          <a:chExt cx="0" cy="0"/>
+        </a:xfrm>
+      </p:grpSpPr>
+      <p:sp>
+        <p:nvSpPr>
+          <p:cNvPr id="2" name="Title 1"/>
+          <p:cNvSpPr>
+            <a:spLocks noGrp="1"/>
+          </p:cNvSpPr>
+          <p:nvPr>
+            <p:ph type="title"/>
+          </p:nvPr>
+        </p:nvSpPr>
+        <p:spPr/>
+        <p:txBody>
+          <a:bodyPr/>
+          <a:lstStyle/>
+          <a:p>
+            <a:r>
+              <a:rPr lang="en-US" dirty="0" smtClean="0"/>
+              <a:t>Creating </a:t>
+            </a:r>
+            <a:r>
+              <a:rPr lang="en-US" dirty="0" err="1" smtClean="0"/>
+              <a:t>pureComputed</a:t>
+            </a:r>
+            <a:r>
+              <a:rPr lang="en-US" dirty="0" smtClean="0"/>
+              <a:t> (or computed)</a:t>
+            </a:r>
+            <a:endParaRPr lang="en-US" dirty="0"/>
+          </a:p>
+        </p:txBody>
+      </p:sp>
+      <p:sp>
+        <p:nvSpPr>
+          <p:cNvPr id="3" name="Content Placeholder 2"/>
+          <p:cNvSpPr>
+            <a:spLocks noGrp="1"/>
+          </p:cNvSpPr>
+          <p:nvPr>
+            <p:ph sz="quarter" idx="10"/>
+          </p:nvPr>
+        </p:nvSpPr>
+        <p:spPr/>
+        <p:txBody>
+          <a:bodyPr/>
+          <a:lstStyle/>
+          <a:p>
+            <a:r>
+              <a:rPr lang="en-US" dirty="0" smtClean="0"/>
+              <a:t>Two parameters</a:t>
+            </a:r>
+          </a:p>
+          <a:p>
+            <a:pPr lvl="1"/>
+            <a:r>
+              <a:rPr lang="en-US" dirty="0" smtClean="0"/>
+              <a:t>Function to return the value</a:t>
+            </a:r>
+          </a:p>
+          <a:p>
+            <a:pPr lvl="1"/>
+            <a:r>
+              <a:rPr lang="en-US" dirty="0" smtClean="0"/>
+              <a:t>What object will represent </a:t>
+            </a:r>
+            <a:r>
+              <a:rPr lang="en-US" dirty="0" smtClean="0">
+                <a:solidFill>
+                  <a:srgbClr val="0070C0"/>
+                </a:solidFill>
+                <a:latin typeface="Consolas" panose="020B0609020204030204" pitchFamily="49" charset="0"/>
+                <a:cs typeface="Consolas" panose="020B0609020204030204" pitchFamily="49" charset="0"/>
+              </a:rPr>
+              <a:t>this</a:t>
+            </a:r>
+            <a:endParaRPr lang="en-US" dirty="0">
+              <a:solidFill>
+                <a:srgbClr val="0070C0"/>
+              </a:solidFill>
+              <a:latin typeface="Consolas" panose="020B0609020204030204" pitchFamily="49" charset="0"/>
+              <a:cs typeface="Consolas" panose="020B0609020204030204" pitchFamily="49" charset="0"/>
+            </a:endParaRPr>
+          </a:p>
+        </p:txBody>
+      </p:sp>
+      <mc:AlternateContent xmlns:mc="http://schemas.openxmlformats.org/markup-compatibility/2006">
+        <mc:Choice xmlns:we="http://schemas.microsoft.com/office/webextensions/webextension/2010/11" xmlns:pca="http://schemas.microsoft.com/office/powerpoint/2013/contentapp" Requires="we pca">
+          <p:graphicFrame>
+            <p:nvGraphicFramePr>
+              <p:cNvPr id="4" name="Add-in 3" title="Code Presenter Pro"/>
+              <p:cNvGraphicFramePr>
+                <a:graphicFrameLocks noGrp="1"/>
+              </p:cNvGraphicFramePr>
+              <p:nvPr>
+                <p:extLst>
+                  <p:ext uri="{D42A27DB-BD31-4B8C-83A1-F6EECF244321}">
+                    <p14:modId xmlns:p14="http://schemas.microsoft.com/office/powerpoint/2010/main" val="1956255011"/>
+                  </p:ext>
+                </p:extLst>
+              </p:nvPr>
+            </p:nvGraphicFramePr>
+            <p:xfrm>
+              <a:off x="0" y="3356386"/>
+              <a:ext cx="12192000" cy="3501613"/>
+            </p:xfrm>
+            <a:graphic>
+              <a:graphicData uri="http://schemas.microsoft.com/office/webextensions/webextension/2010/11">
+                <we:webextensionref xmlns:we="http://schemas.microsoft.com/office/webextensions/webextension/2010/11" xmlns:r="http://schemas.openxmlformats.org/officeDocument/2006/relationships" r:id="rId2"/>
+              </a:graphicData>
+            </a:graphic>
+          </p:graphicFrame>
+        </mc:Choice>
+        <mc:Fallback>
+          <p:pic>
+            <p:nvPicPr>
+              <p:cNvPr id="4" name="Add-in 3" title="Code Presenter Pro"/>
+              <p:cNvPicPr>
+                <a:picLocks noGrp="1" noRot="1" noChangeAspect="1" noMove="1" noResize="1" noEditPoints="1" noAdjustHandles="1" noChangeArrowheads="1" noChangeShapeType="1"/>
+              </p:cNvPicPr>
+              <p:nvPr/>
+            </p:nvPicPr>
+            <p:blipFill>
+              <a:blip r:embed="rId3"/>
+              <a:stretch>
+                <a:fillRect/>
+              </a:stretch>
+            </p:blipFill>
+            <p:spPr>
+              <a:xfrm>
+                <a:off x="0" y="3356386"/>
+                <a:ext cx="12192000" cy="3501613"/>
+              </a:xfrm>
+              <a:prstGeom prst="rect">
+                <a:avLst/>
+              </a:prstGeom>
+            </p:spPr>
+          </p:pic>
+        </mc:Fallback>
+      </mc:AlternateContent>
+    </p:spTree>
+    <p:extLst>
+      <p:ext uri="{BB962C8B-B14F-4D97-AF65-F5344CB8AC3E}">
+        <p14:creationId xmlns:p14="http://schemas.microsoft.com/office/powerpoint/2010/main" val="936766191"/>
+      </p:ext>
+    </p:extLst>
+  </p:cSld>
+  <p:clrMapOvr>
+    <a:masterClrMapping/>
+  </p:clrMapOvr>
+</p:sld>
+</file>
+
+<file path=ppt/slides/slide17.xml><?xml version="1.0" encoding="utf-8"?>
+<p:sld xmlns:a="http://schemas.openxmlformats.org/drawingml/2006/main" xmlns:r="http://schemas.openxmlformats.org/officeDocument/2006/relationships" xmlns:p="http://schemas.openxmlformats.org/presentationml/2006/main">
+  <p:cSld>
+    <p:spTree>
+      <p:nvGrpSpPr>
+        <p:cNvPr id="1" name=""/>
+        <p:cNvGrpSpPr/>
+        <p:nvPr/>
+      </p:nvGrpSpPr>
+      <p:grpSpPr>
+        <a:xfrm>
+          <a:off x="0" y="0"/>
+          <a:ext cx="0" cy="0"/>
+          <a:chOff x="0" y="0"/>
+          <a:chExt cx="0" cy="0"/>
+        </a:xfrm>
+      </p:grpSpPr>
+      <p:sp>
+        <p:nvSpPr>
+          <p:cNvPr id="2" name="Title 1"/>
+          <p:cNvSpPr>
+            <a:spLocks noGrp="1"/>
+          </p:cNvSpPr>
+          <p:nvPr>
+            <p:ph type="title"/>
+          </p:nvPr>
+        </p:nvSpPr>
+        <p:spPr/>
+        <p:txBody>
+          <a:bodyPr/>
+          <a:lstStyle/>
+          <a:p>
+            <a:r>
+              <a:rPr lang="en-US" dirty="0" smtClean="0"/>
+              <a:t>Some design notes</a:t>
+            </a:r>
+            <a:endParaRPr lang="en-US" dirty="0"/>
+          </a:p>
+        </p:txBody>
+      </p:sp>
+      <p:sp>
+        <p:nvSpPr>
+          <p:cNvPr id="3" name="Content Placeholder 2"/>
+          <p:cNvSpPr>
+            <a:spLocks noGrp="1"/>
+          </p:cNvSpPr>
+          <p:nvPr>
+            <p:ph sz="quarter" idx="10"/>
+          </p:nvPr>
+        </p:nvSpPr>
+        <p:spPr/>
+        <p:txBody>
+          <a:bodyPr/>
+          <a:lstStyle/>
+          <a:p>
+            <a:r>
+              <a:rPr lang="en-US" dirty="0" smtClean="0"/>
+              <a:t>A </a:t>
+            </a:r>
+            <a:r>
+              <a:rPr lang="en-US" dirty="0" err="1" smtClean="0"/>
+              <a:t>pureComputed</a:t>
+            </a:r>
+            <a:r>
+              <a:rPr lang="en-US" dirty="0" smtClean="0"/>
+              <a:t> is essentially an event handler</a:t>
+            </a:r>
+          </a:p>
+          <a:p>
+            <a:pPr lvl="1"/>
+            <a:r>
+              <a:rPr lang="en-US" dirty="0" smtClean="0">
+                <a:solidFill>
+                  <a:srgbClr val="0070C0"/>
+                </a:solidFill>
+                <a:latin typeface="Consolas" panose="020B0609020204030204" pitchFamily="49" charset="0"/>
+                <a:cs typeface="Consolas" panose="020B0609020204030204" pitchFamily="49" charset="0"/>
+              </a:rPr>
+              <a:t>this </a:t>
+            </a:r>
+            <a:r>
+              <a:rPr lang="en-US" dirty="0" smtClean="0"/>
+              <a:t>represents whatever raised the event</a:t>
+            </a:r>
+          </a:p>
+          <a:p>
+            <a:pPr lvl="1"/>
+            <a:r>
+              <a:rPr lang="en-US" dirty="0" smtClean="0"/>
+              <a:t>Need to tell Knockout what </a:t>
+            </a:r>
+            <a:r>
+              <a:rPr lang="en-US" dirty="0">
+                <a:solidFill>
+                  <a:srgbClr val="0070C0"/>
+                </a:solidFill>
+                <a:latin typeface="Consolas" panose="020B0609020204030204" pitchFamily="49" charset="0"/>
+                <a:cs typeface="Consolas" panose="020B0609020204030204" pitchFamily="49" charset="0"/>
+              </a:rPr>
+              <a:t>this</a:t>
+            </a:r>
+            <a:r>
+              <a:rPr lang="en-US" dirty="0" smtClean="0"/>
+              <a:t> is</a:t>
+            </a:r>
+          </a:p>
+          <a:p>
+            <a:pPr lvl="1"/>
+            <a:r>
+              <a:rPr lang="en-US" dirty="0" smtClean="0"/>
+              <a:t>Typical pattern to avoid this is to set a variable to represent the object</a:t>
+            </a:r>
+            <a:endParaRPr lang="en-US" dirty="0"/>
+          </a:p>
+        </p:txBody>
+      </p:sp>
+      <mc:AlternateContent xmlns:mc="http://schemas.openxmlformats.org/markup-compatibility/2006">
+        <mc:Choice xmlns:we="http://schemas.microsoft.com/office/webextensions/webextension/2010/11" xmlns:pca="http://schemas.microsoft.com/office/powerpoint/2013/contentapp" Requires="we pca">
+          <p:graphicFrame>
+            <p:nvGraphicFramePr>
+              <p:cNvPr id="4" name="Add-in 3" title="Code Presenter Pro"/>
+              <p:cNvGraphicFramePr>
+                <a:graphicFrameLocks noGrp="1"/>
+              </p:cNvGraphicFramePr>
+              <p:nvPr>
+                <p:extLst>
+                  <p:ext uri="{D42A27DB-BD31-4B8C-83A1-F6EECF244321}">
+                    <p14:modId xmlns:p14="http://schemas.microsoft.com/office/powerpoint/2010/main" val="2233406994"/>
+                  </p:ext>
+                </p:extLst>
+              </p:nvPr>
+            </p:nvGraphicFramePr>
+            <p:xfrm>
+              <a:off x="0" y="3732903"/>
+              <a:ext cx="12192000" cy="3125095"/>
+            </p:xfrm>
+            <a:graphic>
+              <a:graphicData uri="http://schemas.microsoft.com/office/webextensions/webextension/2010/11">
+                <we:webextensionref xmlns:we="http://schemas.microsoft.com/office/webextensions/webextension/2010/11" xmlns:r="http://schemas.openxmlformats.org/officeDocument/2006/relationships" r:id="rId2"/>
+              </a:graphicData>
+            </a:graphic>
+          </p:graphicFrame>
+        </mc:Choice>
+        <mc:Fallback>
+          <p:pic>
+            <p:nvPicPr>
+              <p:cNvPr id="4" name="Add-in 3" title="Code Presenter Pro"/>
+              <p:cNvPicPr>
+                <a:picLocks noGrp="1" noRot="1" noChangeAspect="1" noMove="1" noResize="1" noEditPoints="1" noAdjustHandles="1" noChangeArrowheads="1" noChangeShapeType="1"/>
+              </p:cNvPicPr>
+              <p:nvPr/>
+            </p:nvPicPr>
+            <p:blipFill>
+              <a:blip r:embed="rId3"/>
+              <a:stretch>
+                <a:fillRect/>
+              </a:stretch>
+            </p:blipFill>
+            <p:spPr>
+              <a:xfrm>
+                <a:off x="0" y="3732903"/>
+                <a:ext cx="12192000" cy="3125095"/>
+              </a:xfrm>
+              <a:prstGeom prst="rect">
+                <a:avLst/>
+              </a:prstGeom>
+            </p:spPr>
+          </p:pic>
+        </mc:Fallback>
+      </mc:AlternateContent>
+    </p:spTree>
+    <p:extLst>
+      <p:ext uri="{BB962C8B-B14F-4D97-AF65-F5344CB8AC3E}">
+        <p14:creationId xmlns:p14="http://schemas.microsoft.com/office/powerpoint/2010/main" val="1093880657"/>
+      </p:ext>
+    </p:extLst>
+  </p:cSld>
+  <p:clrMapOvr>
+    <a:masterClrMapping/>
+  </p:clrMapOvr>
+</p:sld>
+</file>
+
+<file path=ppt/slides/slide18.xml><?xml version="1.0" encoding="utf-8"?>
+<p:sld xmlns:a="http://schemas.openxmlformats.org/drawingml/2006/main" xmlns:r="http://schemas.openxmlformats.org/officeDocument/2006/relationships" xmlns:p="http://schemas.openxmlformats.org/presentationml/2006/main">
+  <p:cSld>
+    <p:spTree>
+      <p:nvGrpSpPr>
+        <p:cNvPr id="1" name=""/>
+        <p:cNvGrpSpPr/>
+        <p:nvPr/>
+      </p:nvGrpSpPr>
+      <p:grpSpPr>
+        <a:xfrm>
+          <a:off x="0" y="0"/>
+          <a:ext cx="0" cy="0"/>
+          <a:chOff x="0" y="0"/>
+          <a:chExt cx="0" cy="0"/>
+        </a:xfrm>
+      </p:grpSpPr>
+      <p:sp>
+        <p:nvSpPr>
+          <p:cNvPr id="2" name="Title 1"/>
+          <p:cNvSpPr>
+            <a:spLocks noGrp="1"/>
+          </p:cNvSpPr>
+          <p:nvPr>
+            <p:ph type="title"/>
+          </p:nvPr>
+        </p:nvSpPr>
+        <p:spPr/>
+        <p:txBody>
+          <a:bodyPr/>
+          <a:lstStyle/>
+          <a:p>
+            <a:r>
+              <a:rPr lang="en-US" dirty="0" smtClean="0"/>
+              <a:t>More design notes</a:t>
+            </a:r>
+            <a:endParaRPr lang="en-US" dirty="0"/>
+          </a:p>
+        </p:txBody>
+      </p:sp>
+      <p:sp>
+        <p:nvSpPr>
+          <p:cNvPr id="3" name="Content Placeholder 2"/>
+          <p:cNvSpPr>
+            <a:spLocks noGrp="1"/>
+          </p:cNvSpPr>
+          <p:nvPr>
+            <p:ph sz="quarter" idx="10"/>
+          </p:nvPr>
+        </p:nvSpPr>
+        <p:spPr/>
+        <p:txBody>
+          <a:bodyPr/>
+          <a:lstStyle/>
+          <a:p>
+            <a:r>
+              <a:rPr lang="en-US" dirty="0" smtClean="0"/>
+              <a:t>Knockout’s observable is a wrapper for the actual value</a:t>
+            </a:r>
+          </a:p>
+          <a:p>
+            <a:pPr lvl="1"/>
+            <a:r>
+              <a:rPr lang="en-US" dirty="0" smtClean="0"/>
+              <a:t>If you want the actual value you need to call the function to retrieve it</a:t>
+            </a:r>
+            <a:endParaRPr lang="en-US" dirty="0"/>
+          </a:p>
+        </p:txBody>
+      </p:sp>
+      <mc:AlternateContent xmlns:mc="http://schemas.openxmlformats.org/markup-compatibility/2006" xmlns:we="http://schemas.microsoft.com/office/webextensions/webextension/2010/11" xmlns:pca="http://schemas.microsoft.com/office/powerpoint/2013/contentapp">
+        <mc:Choice Requires="we pca">
+          <p:graphicFrame>
+            <p:nvGraphicFramePr>
+              <p:cNvPr id="4" name="Add-in 3" title="Code Presenter Pro"/>
+              <p:cNvGraphicFramePr>
+                <a:graphicFrameLocks noGrp="1"/>
+              </p:cNvGraphicFramePr>
+              <p:nvPr>
+                <p:extLst>
+                  <p:ext uri="{D42A27DB-BD31-4B8C-83A1-F6EECF244321}">
+                    <p14:modId xmlns:p14="http://schemas.microsoft.com/office/powerpoint/2010/main" val="4031924520"/>
+                  </p:ext>
+                </p:extLst>
+              </p:nvPr>
+            </p:nvGraphicFramePr>
+            <p:xfrm>
+              <a:off x="21066" y="3313354"/>
+              <a:ext cx="12170933" cy="3554057"/>
+            </p:xfrm>
+            <a:graphic>
+              <a:graphicData uri="http://schemas.microsoft.com/office/webextensions/webextension/2010/11">
+                <we:webextensionref xmlns:we="http://schemas.microsoft.com/office/webextensions/webextension/2010/11" xmlns:r="http://schemas.openxmlformats.org/officeDocument/2006/relationships" r:id="rId2"/>
+              </a:graphicData>
+            </a:graphic>
+          </p:graphicFrame>
+        </mc:Choice>
+        <mc:Fallback xmlns="">
+          <p:pic>
+            <p:nvPicPr>
+              <p:cNvPr id="4" name="Add-in 3" title="Code Presenter Pro"/>
+              <p:cNvPicPr>
+                <a:picLocks noGrp="1" noRot="1" noChangeAspect="1" noMove="1" noResize="1" noEditPoints="1" noAdjustHandles="1" noChangeArrowheads="1" noChangeShapeType="1"/>
+              </p:cNvPicPr>
+              <p:nvPr/>
+            </p:nvPicPr>
+            <p:blipFill>
+              <a:blip r:embed="rId3"/>
+              <a:stretch>
+                <a:fillRect/>
+              </a:stretch>
+            </p:blipFill>
+            <p:spPr>
+              <a:xfrm>
+                <a:off x="21066" y="3313354"/>
+                <a:ext cx="12170933" cy="3554057"/>
+              </a:xfrm>
+              <a:prstGeom prst="rect">
+                <a:avLst/>
+              </a:prstGeom>
+            </p:spPr>
+          </p:pic>
+        </mc:Fallback>
+      </mc:AlternateContent>
+    </p:spTree>
+    <p:extLst>
+      <p:ext uri="{BB962C8B-B14F-4D97-AF65-F5344CB8AC3E}">
+        <p14:creationId xmlns:p14="http://schemas.microsoft.com/office/powerpoint/2010/main" val="447332486"/>
+      </p:ext>
+    </p:extLst>
+  </p:cSld>
+  <p:clrMapOvr>
+    <a:masterClrMapping/>
+  </p:clrMapOvr>
+</p:sld>
+</file>
+
+<file path=ppt/slides/slide19.xml><?xml version="1.0" encoding="utf-8"?>
+<p:sld xmlns:a="http://schemas.openxmlformats.org/drawingml/2006/main" xmlns:r="http://schemas.openxmlformats.org/officeDocument/2006/relationships" xmlns:p="http://schemas.openxmlformats.org/presentationml/2006/main">
+  <p:cSld>
+    <p:spTree>
+      <p:nvGrpSpPr>
+        <p:cNvPr id="1" name=""/>
+        <p:cNvGrpSpPr/>
+        <p:nvPr/>
+      </p:nvGrpSpPr>
+      <p:grpSpPr>
+        <a:xfrm>
+          <a:off x="0" y="0"/>
+          <a:ext cx="0" cy="0"/>
+          <a:chOff x="0" y="0"/>
+          <a:chExt cx="0" cy="0"/>
+        </a:xfrm>
+      </p:grpSpPr>
+      <p:sp>
+        <p:nvSpPr>
+          <p:cNvPr id="2" name="Title 1"/>
+          <p:cNvSpPr>
+            <a:spLocks noGrp="1"/>
+          </p:cNvSpPr>
+          <p:nvPr>
+            <p:ph type="title"/>
+          </p:nvPr>
+        </p:nvSpPr>
+        <p:spPr/>
+        <p:txBody>
+          <a:bodyPr/>
+          <a:lstStyle/>
+          <a:p>
+            <a:r>
+              <a:rPr lang="en-US" dirty="0" smtClean="0"/>
+              <a:t>Computed values</a:t>
+            </a:r>
+            <a:endParaRPr lang="en-US" dirty="0"/>
+          </a:p>
+        </p:txBody>
+      </p:sp>
+    </p:spTree>
+    <p:extLst>
+      <p:ext uri="{BB962C8B-B14F-4D97-AF65-F5344CB8AC3E}">
+        <p14:creationId xmlns:p14="http://schemas.microsoft.com/office/powerpoint/2010/main" val="4201762849"/>
+      </p:ext>
+    </p:extLst>
+  </p:cSld>
+  <p:clrMapOvr>
+    <a:masterClrMapping/>
+  </p:clrMapOvr>
+</p:sld>
+</file>
+
+<file path=ppt/slides/slide2.xml><?xml version="1.0" encoding="utf-8"?>
+<p:sld xmlns:a="http://schemas.openxmlformats.org/drawingml/2006/main" xmlns:r="http://schemas.openxmlformats.org/officeDocument/2006/relationships" xmlns:p="http://schemas.openxmlformats.org/presentationml/2006/main">
+  <p:cSld>
+    <p:spTree>
+      <p:nvGrpSpPr>
+        <p:cNvPr id="1" name=""/>
+        <p:cNvGrpSpPr/>
+        <p:nvPr/>
+      </p:nvGrpSpPr>
+      <p:grpSpPr>
+        <a:xfrm>
+          <a:off x="0" y="0"/>
+          <a:ext cx="0" cy="0"/>
+          <a:chOff x="0" y="0"/>
+          <a:chExt cx="0" cy="0"/>
+        </a:xfrm>
+      </p:grpSpPr>
+      <p:sp>
+        <p:nvSpPr>
+          <p:cNvPr id="4" name="Title 3"/>
+          <p:cNvSpPr>
+            <a:spLocks noGrp="1"/>
+          </p:cNvSpPr>
+          <p:nvPr>
+            <p:ph type="title"/>
+          </p:nvPr>
+        </p:nvSpPr>
+        <p:spPr/>
+        <p:txBody>
+          <a:bodyPr/>
+          <a:lstStyle/>
+          <a:p>
+            <a:r>
+              <a:rPr lang="en-US" dirty="0" smtClean="0"/>
+              <a:t>Models and bindings</a:t>
+            </a:r>
+            <a:endParaRPr lang="en-US" dirty="0"/>
+          </a:p>
+        </p:txBody>
+      </p:sp>
+      <p:sp>
+        <p:nvSpPr>
+          <p:cNvPr id="5" name="Content Placeholder 4"/>
+          <p:cNvSpPr>
+            <a:spLocks noGrp="1"/>
+          </p:cNvSpPr>
+          <p:nvPr>
+            <p:ph sz="quarter" idx="10"/>
+          </p:nvPr>
+        </p:nvSpPr>
+        <p:spPr/>
+        <p:txBody>
+          <a:bodyPr/>
+          <a:lstStyle/>
+          <a:p>
+            <a:r>
+              <a:rPr lang="en-US" dirty="0" smtClean="0"/>
+              <a:t>Creating a model</a:t>
+            </a:r>
+          </a:p>
+          <a:p>
+            <a:r>
+              <a:rPr lang="en-US" dirty="0" smtClean="0"/>
+              <a:t>Binding data and observables</a:t>
+            </a:r>
+          </a:p>
+          <a:p>
+            <a:r>
+              <a:rPr lang="en-US" dirty="0" smtClean="0"/>
+              <a:t>Computed observables</a:t>
+            </a:r>
+            <a:endParaRPr lang="en-US" dirty="0"/>
+          </a:p>
+        </p:txBody>
+      </p:sp>
+    </p:spTree>
+    <p:extLst>
+      <p:ext uri="{BB962C8B-B14F-4D97-AF65-F5344CB8AC3E}">
+        <p14:creationId xmlns:p14="http://schemas.microsoft.com/office/powerpoint/2010/main" val="3416292743"/>
+      </p:ext>
+    </p:extLst>
+  </p:cSld>
+  <p:clrMapOvr>
+    <a:masterClrMapping/>
+  </p:clrMapOvr>
+</p:sld>
+</file>
+
+<file path=ppt/slides/slide20.xml><?xml version="1.0" encoding="utf-8"?>
+<p:sld xmlns:a="http://schemas.openxmlformats.org/drawingml/2006/main" xmlns:r="http://schemas.openxmlformats.org/officeDocument/2006/relationships" xmlns:p="http://schemas.openxmlformats.org/presentationml/2006/main">
+  <p:cSld>
+    <p:spTree>
+      <p:nvGrpSpPr>
+        <p:cNvPr id="1" name=""/>
+        <p:cNvGrpSpPr/>
+        <p:nvPr/>
+      </p:nvGrpSpPr>
+      <p:grpSpPr>
+        <a:xfrm>
+          <a:off x="0" y="0"/>
+          <a:ext cx="0" cy="0"/>
+          <a:chOff x="0" y="0"/>
+          <a:chExt cx="0" cy="0"/>
+        </a:xfrm>
+      </p:grpSpPr>
+      <p:sp>
+        <p:nvSpPr>
+          <p:cNvPr id="5" name="Title 4"/>
+          <p:cNvSpPr>
+            <a:spLocks noGrp="1"/>
+          </p:cNvSpPr>
+          <p:nvPr>
+            <p:ph type="title"/>
+          </p:nvPr>
+        </p:nvSpPr>
+        <p:spPr/>
+        <p:txBody>
+          <a:bodyPr/>
+          <a:lstStyle/>
+          <a:p>
+            <a:r>
+              <a:rPr lang="en-CA" dirty="0" smtClean="0"/>
+              <a:t>CSS binding</a:t>
+            </a:r>
+            <a:endParaRPr lang="en-US" dirty="0"/>
+          </a:p>
+        </p:txBody>
+      </p:sp>
+    </p:spTree>
+    <p:extLst>
+      <p:ext uri="{BB962C8B-B14F-4D97-AF65-F5344CB8AC3E}">
+        <p14:creationId xmlns:p14="http://schemas.microsoft.com/office/powerpoint/2010/main" val="3065726087"/>
       </p:ext>
     </p:extLst>
   </p:cSld>
@@ -3974,7 +4702,540 @@
 </p:sld>
 </file>
 
-<file path=ppt/slides/slide13.xml><?xml version="1.0" encoding="utf-8"?>
+<file path=ppt/slides/slide21.xml><?xml version="1.0" encoding="utf-8"?>
+<p:sld xmlns:a="http://schemas.openxmlformats.org/drawingml/2006/main" xmlns:r="http://schemas.openxmlformats.org/officeDocument/2006/relationships" xmlns:p="http://schemas.openxmlformats.org/presentationml/2006/main">
+  <p:cSld>
+    <p:spTree>
+      <p:nvGrpSpPr>
+        <p:cNvPr id="1" name=""/>
+        <p:cNvGrpSpPr/>
+        <p:nvPr/>
+      </p:nvGrpSpPr>
+      <p:grpSpPr>
+        <a:xfrm>
+          <a:off x="0" y="0"/>
+          <a:ext cx="0" cy="0"/>
+          <a:chOff x="0" y="0"/>
+          <a:chExt cx="0" cy="0"/>
+        </a:xfrm>
+      </p:grpSpPr>
+      <p:sp>
+        <p:nvSpPr>
+          <p:cNvPr id="2" name="Title 1"/>
+          <p:cNvSpPr>
+            <a:spLocks noGrp="1"/>
+          </p:cNvSpPr>
+          <p:nvPr>
+            <p:ph type="title"/>
+          </p:nvPr>
+        </p:nvSpPr>
+        <p:spPr/>
+        <p:txBody>
+          <a:bodyPr/>
+          <a:lstStyle/>
+          <a:p>
+            <a:r>
+              <a:rPr lang="en-US" dirty="0" smtClean="0"/>
+              <a:t>Forms</a:t>
+            </a:r>
+            <a:endParaRPr lang="en-US" dirty="0"/>
+          </a:p>
+        </p:txBody>
+      </p:sp>
+    </p:spTree>
+    <p:extLst>
+      <p:ext uri="{BB962C8B-B14F-4D97-AF65-F5344CB8AC3E}">
+        <p14:creationId xmlns:p14="http://schemas.microsoft.com/office/powerpoint/2010/main" val="2857644327"/>
+      </p:ext>
+    </p:extLst>
+  </p:cSld>
+  <p:clrMapOvr>
+    <a:masterClrMapping/>
+  </p:clrMapOvr>
+</p:sld>
+</file>
+
+<file path=ppt/slides/slide22.xml><?xml version="1.0" encoding="utf-8"?>
+<p:sld xmlns:a="http://schemas.openxmlformats.org/drawingml/2006/main" xmlns:r="http://schemas.openxmlformats.org/officeDocument/2006/relationships" xmlns:p="http://schemas.openxmlformats.org/presentationml/2006/main">
+  <p:cSld>
+    <p:spTree>
+      <p:nvGrpSpPr>
+        <p:cNvPr id="1" name=""/>
+        <p:cNvGrpSpPr/>
+        <p:nvPr/>
+      </p:nvGrpSpPr>
+      <p:grpSpPr>
+        <a:xfrm>
+          <a:off x="0" y="0"/>
+          <a:ext cx="0" cy="0"/>
+          <a:chOff x="0" y="0"/>
+          <a:chExt cx="0" cy="0"/>
+        </a:xfrm>
+      </p:grpSpPr>
+      <p:sp>
+        <p:nvSpPr>
+          <p:cNvPr id="4" name="Text Placeholder 3"/>
+          <p:cNvSpPr>
+            <a:spLocks noGrp="1"/>
+          </p:cNvSpPr>
+          <p:nvPr>
+            <p:ph type="body" sz="quarter" idx="10"/>
+          </p:nvPr>
+        </p:nvSpPr>
+        <p:spPr/>
+        <p:txBody>
+          <a:bodyPr/>
+          <a:lstStyle/>
+          <a:p>
+            <a:r>
+              <a:rPr lang="en-US" dirty="0" smtClean="0"/>
+              <a:t>Observable arrays</a:t>
+            </a:r>
+            <a:endParaRPr lang="en-US" dirty="0"/>
+          </a:p>
+        </p:txBody>
+      </p:sp>
+      <p:sp>
+        <p:nvSpPr>
+          <p:cNvPr id="3" name="Subtitle 2"/>
+          <p:cNvSpPr>
+            <a:spLocks noGrp="1"/>
+          </p:cNvSpPr>
+          <p:nvPr>
+            <p:ph type="subTitle" idx="1"/>
+          </p:nvPr>
+        </p:nvSpPr>
+        <p:spPr/>
+        <p:txBody>
+          <a:bodyPr/>
+          <a:lstStyle/>
+          <a:p>
+            <a:endParaRPr lang="en-US" dirty="0"/>
+          </a:p>
+        </p:txBody>
+      </p:sp>
+    </p:spTree>
+    <p:extLst>
+      <p:ext uri="{BB962C8B-B14F-4D97-AF65-F5344CB8AC3E}">
+        <p14:creationId xmlns:p14="http://schemas.microsoft.com/office/powerpoint/2010/main" val="378674063"/>
+      </p:ext>
+    </p:extLst>
+  </p:cSld>
+  <p:clrMapOvr>
+    <a:masterClrMapping/>
+  </p:clrMapOvr>
+</p:sld>
+</file>
+
+<file path=ppt/slides/slide23.xml><?xml version="1.0" encoding="utf-8"?>
+<p:sld xmlns:a="http://schemas.openxmlformats.org/drawingml/2006/main" xmlns:r="http://schemas.openxmlformats.org/officeDocument/2006/relationships" xmlns:p="http://schemas.openxmlformats.org/presentationml/2006/main">
+  <p:cSld>
+    <p:spTree>
+      <p:nvGrpSpPr>
+        <p:cNvPr id="1" name=""/>
+        <p:cNvGrpSpPr/>
+        <p:nvPr/>
+      </p:nvGrpSpPr>
+      <p:grpSpPr>
+        <a:xfrm>
+          <a:off x="0" y="0"/>
+          <a:ext cx="0" cy="0"/>
+          <a:chOff x="0" y="0"/>
+          <a:chExt cx="0" cy="0"/>
+        </a:xfrm>
+      </p:grpSpPr>
+      <p:sp>
+        <p:nvSpPr>
+          <p:cNvPr id="4" name="Title 3"/>
+          <p:cNvSpPr>
+            <a:spLocks noGrp="1"/>
+          </p:cNvSpPr>
+          <p:nvPr>
+            <p:ph type="title"/>
+          </p:nvPr>
+        </p:nvSpPr>
+        <p:spPr/>
+        <p:txBody>
+          <a:bodyPr>
+            <a:normAutofit fontScale="90000"/>
+          </a:bodyPr>
+          <a:lstStyle/>
+          <a:p>
+            <a:r>
+              <a:rPr lang="en-US" dirty="0" smtClean="0"/>
+              <a:t>Knockout also allows collections to be observable</a:t>
+            </a:r>
+            <a:endParaRPr lang="en-US" dirty="0"/>
+          </a:p>
+        </p:txBody>
+      </p:sp>
+      <p:sp>
+        <p:nvSpPr>
+          <p:cNvPr id="5" name="Content Placeholder 4"/>
+          <p:cNvSpPr>
+            <a:spLocks noGrp="1"/>
+          </p:cNvSpPr>
+          <p:nvPr>
+            <p:ph sz="quarter" idx="10"/>
+          </p:nvPr>
+        </p:nvSpPr>
+        <p:spPr/>
+        <p:txBody>
+          <a:bodyPr>
+            <a:normAutofit lnSpcReduction="10000"/>
+          </a:bodyPr>
+          <a:lstStyle/>
+          <a:p>
+            <a:r>
+              <a:rPr lang="en-US" dirty="0" smtClean="0"/>
+              <a:t>Wrapper for JavaScript arrays</a:t>
+            </a:r>
+          </a:p>
+          <a:p>
+            <a:r>
+              <a:rPr lang="en-US" dirty="0" smtClean="0"/>
+              <a:t>Provides additional functionality</a:t>
+            </a:r>
+          </a:p>
+          <a:p>
+            <a:r>
+              <a:rPr lang="en-US" dirty="0" smtClean="0"/>
+              <a:t>Methods</a:t>
+            </a:r>
+          </a:p>
+          <a:p>
+            <a:pPr lvl="1"/>
+            <a:r>
+              <a:rPr lang="en-US" dirty="0" err="1" smtClean="0"/>
+              <a:t>unsplit</a:t>
+            </a:r>
+            <a:endParaRPr lang="en-US" dirty="0"/>
+          </a:p>
+          <a:p>
+            <a:pPr lvl="2"/>
+            <a:r>
+              <a:rPr lang="en-US" dirty="0" smtClean="0"/>
+              <a:t>Top of the list</a:t>
+            </a:r>
+          </a:p>
+          <a:p>
+            <a:pPr lvl="1"/>
+            <a:r>
+              <a:rPr lang="en-US" dirty="0" smtClean="0"/>
+              <a:t>push</a:t>
+            </a:r>
+          </a:p>
+          <a:p>
+            <a:pPr lvl="2"/>
+            <a:r>
+              <a:rPr lang="en-US" dirty="0" smtClean="0"/>
+              <a:t>Bottom of the list</a:t>
+            </a:r>
+          </a:p>
+          <a:p>
+            <a:pPr lvl="1"/>
+            <a:r>
+              <a:rPr lang="en-US" dirty="0" smtClean="0"/>
+              <a:t>split</a:t>
+            </a:r>
+          </a:p>
+          <a:p>
+            <a:pPr lvl="2"/>
+            <a:r>
+              <a:rPr lang="en-US" dirty="0" smtClean="0"/>
+              <a:t>Remove and return the top object</a:t>
+            </a:r>
+          </a:p>
+          <a:p>
+            <a:pPr lvl="1"/>
+            <a:r>
+              <a:rPr lang="en-US" dirty="0" smtClean="0"/>
+              <a:t>pop</a:t>
+            </a:r>
+          </a:p>
+          <a:p>
+            <a:pPr lvl="2"/>
+            <a:r>
+              <a:rPr lang="en-US" dirty="0" smtClean="0"/>
+              <a:t>Remove and return the bottom object</a:t>
+            </a:r>
+            <a:endParaRPr lang="en-US" dirty="0"/>
+          </a:p>
+        </p:txBody>
+      </p:sp>
+    </p:spTree>
+    <p:extLst>
+      <p:ext uri="{BB962C8B-B14F-4D97-AF65-F5344CB8AC3E}">
+        <p14:creationId xmlns:p14="http://schemas.microsoft.com/office/powerpoint/2010/main" val="3922499572"/>
+      </p:ext>
+    </p:extLst>
+  </p:cSld>
+  <p:clrMapOvr>
+    <a:masterClrMapping/>
+  </p:clrMapOvr>
+</p:sld>
+</file>
+
+<file path=ppt/slides/slide24.xml><?xml version="1.0" encoding="utf-8"?>
+<p:sld xmlns:a="http://schemas.openxmlformats.org/drawingml/2006/main" xmlns:r="http://schemas.openxmlformats.org/officeDocument/2006/relationships" xmlns:p="http://schemas.openxmlformats.org/presentationml/2006/main">
+  <p:cSld>
+    <p:spTree>
+      <p:nvGrpSpPr>
+        <p:cNvPr id="1" name=""/>
+        <p:cNvGrpSpPr/>
+        <p:nvPr/>
+      </p:nvGrpSpPr>
+      <p:grpSpPr>
+        <a:xfrm>
+          <a:off x="0" y="0"/>
+          <a:ext cx="0" cy="0"/>
+          <a:chOff x="0" y="0"/>
+          <a:chExt cx="0" cy="0"/>
+        </a:xfrm>
+      </p:grpSpPr>
+      <p:sp>
+        <p:nvSpPr>
+          <p:cNvPr id="2" name="Title 1"/>
+          <p:cNvSpPr>
+            <a:spLocks noGrp="1"/>
+          </p:cNvSpPr>
+          <p:nvPr>
+            <p:ph type="title"/>
+          </p:nvPr>
+        </p:nvSpPr>
+        <p:spPr/>
+        <p:txBody>
+          <a:bodyPr/>
+          <a:lstStyle/>
+          <a:p>
+            <a:r>
+              <a:rPr lang="en-US" dirty="0" smtClean="0"/>
+              <a:t>Arrays and </a:t>
+            </a:r>
+            <a:r>
+              <a:rPr lang="en-US" dirty="0" err="1" smtClean="0"/>
+              <a:t>foreach</a:t>
+            </a:r>
+            <a:r>
+              <a:rPr lang="en-US" smtClean="0"/>
+              <a:t> bindings</a:t>
+            </a:r>
+            <a:endParaRPr lang="en-US" dirty="0"/>
+          </a:p>
+        </p:txBody>
+      </p:sp>
+    </p:spTree>
+    <p:extLst>
+      <p:ext uri="{BB962C8B-B14F-4D97-AF65-F5344CB8AC3E}">
+        <p14:creationId xmlns:p14="http://schemas.microsoft.com/office/powerpoint/2010/main" val="3094636133"/>
+      </p:ext>
+    </p:extLst>
+  </p:cSld>
+  <p:clrMapOvr>
+    <a:masterClrMapping/>
+  </p:clrMapOvr>
+</p:sld>
+</file>
+
+<file path=ppt/slides/slide25.xml><?xml version="1.0" encoding="utf-8"?>
+<p:sld xmlns:a="http://schemas.openxmlformats.org/drawingml/2006/main" xmlns:r="http://schemas.openxmlformats.org/officeDocument/2006/relationships" xmlns:p="http://schemas.openxmlformats.org/presentationml/2006/main">
+  <p:cSld>
+    <p:spTree>
+      <p:nvGrpSpPr>
+        <p:cNvPr id="1" name=""/>
+        <p:cNvGrpSpPr/>
+        <p:nvPr/>
+      </p:nvGrpSpPr>
+      <p:grpSpPr>
+        <a:xfrm>
+          <a:off x="0" y="0"/>
+          <a:ext cx="0" cy="0"/>
+          <a:chOff x="0" y="0"/>
+          <a:chExt cx="0" cy="0"/>
+        </a:xfrm>
+      </p:grpSpPr>
+      <p:sp>
+        <p:nvSpPr>
+          <p:cNvPr id="3" name="Title 2"/>
+          <p:cNvSpPr>
+            <a:spLocks noGrp="1"/>
+          </p:cNvSpPr>
+          <p:nvPr>
+            <p:ph type="title"/>
+          </p:nvPr>
+        </p:nvSpPr>
+        <p:spPr/>
+        <p:txBody>
+          <a:bodyPr/>
+          <a:lstStyle/>
+          <a:p>
+            <a:r>
+              <a:rPr lang="en-US" dirty="0" smtClean="0"/>
+              <a:t>Options binding</a:t>
+            </a:r>
+            <a:endParaRPr lang="en-US" dirty="0"/>
+          </a:p>
+        </p:txBody>
+      </p:sp>
+      <p:sp>
+        <p:nvSpPr>
+          <p:cNvPr id="4" name="Content Placeholder 3"/>
+          <p:cNvSpPr>
+            <a:spLocks noGrp="1"/>
+          </p:cNvSpPr>
+          <p:nvPr>
+            <p:ph sz="quarter" idx="10"/>
+          </p:nvPr>
+        </p:nvSpPr>
+        <p:spPr/>
+        <p:txBody>
+          <a:bodyPr>
+            <a:normAutofit lnSpcReduction="10000"/>
+          </a:bodyPr>
+          <a:lstStyle/>
+          <a:p>
+            <a:r>
+              <a:rPr lang="en-US" dirty="0" smtClean="0"/>
+              <a:t>You can also bind an array to a dropdown list</a:t>
+            </a:r>
+          </a:p>
+          <a:p>
+            <a:endParaRPr lang="en-US" dirty="0"/>
+          </a:p>
+          <a:p>
+            <a:r>
+              <a:rPr lang="en-US" dirty="0" smtClean="0"/>
+              <a:t>Bindings</a:t>
+            </a:r>
+          </a:p>
+          <a:p>
+            <a:pPr lvl="1"/>
+            <a:r>
+              <a:rPr lang="en-US" dirty="0" smtClean="0"/>
+              <a:t>options</a:t>
+            </a:r>
+          </a:p>
+          <a:p>
+            <a:pPr lvl="2"/>
+            <a:r>
+              <a:rPr lang="en-US" dirty="0" smtClean="0"/>
+              <a:t>The array of objects</a:t>
+            </a:r>
+          </a:p>
+          <a:p>
+            <a:pPr lvl="1"/>
+            <a:r>
+              <a:rPr lang="en-US" dirty="0" err="1" smtClean="0"/>
+              <a:t>optionsText</a:t>
+            </a:r>
+            <a:endParaRPr lang="en-US" dirty="0" smtClean="0"/>
+          </a:p>
+          <a:p>
+            <a:pPr lvl="2"/>
+            <a:r>
+              <a:rPr lang="en-US" dirty="0" smtClean="0"/>
+              <a:t>Property to use for display</a:t>
+            </a:r>
+          </a:p>
+          <a:p>
+            <a:pPr lvl="1"/>
+            <a:r>
+              <a:rPr lang="en-US" dirty="0" err="1" smtClean="0"/>
+              <a:t>optionsCaption</a:t>
+            </a:r>
+            <a:endParaRPr lang="en-US" dirty="0" smtClean="0"/>
+          </a:p>
+          <a:p>
+            <a:pPr lvl="2"/>
+            <a:r>
+              <a:rPr lang="en-US" dirty="0" smtClean="0"/>
+              <a:t>Text to display as prompt</a:t>
+            </a:r>
+          </a:p>
+          <a:p>
+            <a:pPr lvl="1"/>
+            <a:r>
+              <a:rPr lang="en-US" dirty="0" smtClean="0"/>
+              <a:t>value</a:t>
+            </a:r>
+          </a:p>
+          <a:p>
+            <a:pPr lvl="2"/>
+            <a:r>
+              <a:rPr lang="en-US" dirty="0" smtClean="0"/>
+              <a:t>Pre-bind selected value</a:t>
+            </a:r>
+            <a:endParaRPr lang="en-US" dirty="0"/>
+          </a:p>
+        </p:txBody>
+      </p:sp>
+    </p:spTree>
+    <p:extLst>
+      <p:ext uri="{BB962C8B-B14F-4D97-AF65-F5344CB8AC3E}">
+        <p14:creationId xmlns:p14="http://schemas.microsoft.com/office/powerpoint/2010/main" val="2233022061"/>
+      </p:ext>
+    </p:extLst>
+  </p:cSld>
+  <p:clrMapOvr>
+    <a:masterClrMapping/>
+  </p:clrMapOvr>
+</p:sld>
+</file>
+
+<file path=ppt/slides/slide26.xml><?xml version="1.0" encoding="utf-8"?>
+<p:sld xmlns:a="http://schemas.openxmlformats.org/drawingml/2006/main" xmlns:r="http://schemas.openxmlformats.org/officeDocument/2006/relationships" xmlns:p="http://schemas.openxmlformats.org/presentationml/2006/main">
+  <p:cSld>
+    <p:spTree>
+      <p:nvGrpSpPr>
+        <p:cNvPr id="1" name=""/>
+        <p:cNvGrpSpPr/>
+        <p:nvPr/>
+      </p:nvGrpSpPr>
+      <p:grpSpPr>
+        <a:xfrm>
+          <a:off x="0" y="0"/>
+          <a:ext cx="0" cy="0"/>
+          <a:chOff x="0" y="0"/>
+          <a:chExt cx="0" cy="0"/>
+        </a:xfrm>
+      </p:grpSpPr>
+      <p:sp>
+        <p:nvSpPr>
+          <p:cNvPr id="4" name="Title 3"/>
+          <p:cNvSpPr>
+            <a:spLocks noGrp="1"/>
+          </p:cNvSpPr>
+          <p:nvPr>
+            <p:ph type="title"/>
+          </p:nvPr>
+        </p:nvSpPr>
+        <p:spPr/>
+        <p:txBody>
+          <a:bodyPr/>
+          <a:lstStyle/>
+          <a:p>
+            <a:r>
+              <a:rPr lang="en-US" dirty="0" smtClean="0"/>
+              <a:t>Create bug</a:t>
+            </a:r>
+            <a:endParaRPr lang="en-US" dirty="0"/>
+          </a:p>
+        </p:txBody>
+      </p:sp>
+    </p:spTree>
+    <p:extLst>
+      <p:ext uri="{BB962C8B-B14F-4D97-AF65-F5344CB8AC3E}">
+        <p14:creationId xmlns:p14="http://schemas.microsoft.com/office/powerpoint/2010/main" val="4165646575"/>
+      </p:ext>
+    </p:extLst>
+  </p:cSld>
+  <p:clrMapOvr>
+    <a:masterClrMapping/>
+  </p:clrMapOvr>
+</p:sld>
+</file>
+
+<file path=ppt/slides/slide27.xml><?xml version="1.0" encoding="utf-8"?>
 <p:sld xmlns:a="http://schemas.openxmlformats.org/drawingml/2006/main" xmlns:r="http://schemas.openxmlformats.org/officeDocument/2006/relationships" xmlns:p="http://schemas.openxmlformats.org/presentationml/2006/main">
   <p:cSld>
     <p:spTree>
@@ -4019,331 +5280,6 @@
 </p:sld>
 </file>
 
-<file path=ppt/slides/slide2.xml><?xml version="1.0" encoding="utf-8"?>
-<p:sld xmlns:a="http://schemas.openxmlformats.org/drawingml/2006/main" xmlns:r="http://schemas.openxmlformats.org/officeDocument/2006/relationships" xmlns:p="http://schemas.openxmlformats.org/presentationml/2006/main">
-  <p:cSld>
-    <p:spTree>
-      <p:nvGrpSpPr>
-        <p:cNvPr id="1" name=""/>
-        <p:cNvGrpSpPr/>
-        <p:nvPr/>
-      </p:nvGrpSpPr>
-      <p:grpSpPr>
-        <a:xfrm>
-          <a:off x="0" y="0"/>
-          <a:ext cx="0" cy="0"/>
-          <a:chOff x="0" y="0"/>
-          <a:chExt cx="0" cy="0"/>
-        </a:xfrm>
-      </p:grpSpPr>
-      <p:sp>
-        <p:nvSpPr>
-          <p:cNvPr id="2" name="Title 1"/>
-          <p:cNvSpPr>
-            <a:spLocks noGrp="1"/>
-          </p:cNvSpPr>
-          <p:nvPr>
-            <p:ph type="title"/>
-          </p:nvPr>
-        </p:nvSpPr>
-        <p:spPr/>
-        <p:txBody>
-          <a:bodyPr>
-            <a:normAutofit/>
-          </a:bodyPr>
-          <a:lstStyle/>
-          <a:p>
-            <a:pPr lvl="0"/>
-            <a:r>
-              <a:rPr lang="en-US" dirty="0" smtClean="0"/>
-              <a:t>Course Topics</a:t>
-            </a:r>
-            <a:endParaRPr lang="en-US" dirty="0"/>
-          </a:p>
-        </p:txBody>
-      </p:sp>
-      <p:graphicFrame>
-        <p:nvGraphicFramePr>
-          <p:cNvPr id="4" name="Content Placeholder 3"/>
-          <p:cNvGraphicFramePr>
-            <a:graphicFrameLocks noGrp="1"/>
-          </p:cNvGraphicFramePr>
-          <p:nvPr>
-            <p:ph sz="quarter" idx="10"/>
-            <p:extLst>
-              <p:ext uri="{D42A27DB-BD31-4B8C-83A1-F6EECF244321}">
-                <p14:modId xmlns:p14="http://schemas.microsoft.com/office/powerpoint/2010/main" val="1190803272"/>
-              </p:ext>
-            </p:extLst>
-          </p:nvPr>
-        </p:nvGraphicFramePr>
-        <p:xfrm>
-          <a:off x="379413" y="1417636"/>
-          <a:ext cx="11525250" cy="3070528"/>
-        </p:xfrm>
-        <a:graphic>
-          <a:graphicData uri="http://schemas.openxmlformats.org/drawingml/2006/table">
-            <a:tbl>
-              <a:tblPr firstRow="1" bandRow="1">
-                <a:tableStyleId>{5C22544A-7EE6-4342-B048-85BDC9FD1C3A}</a:tableStyleId>
-              </a:tblPr>
-              <a:tblGrid>
-                <a:gridCol w="5228907">
-                  <a:extLst>
-                    <a:ext uri="{9D8B030D-6E8A-4147-A177-3AD203B41FA5}">
-                      <a16:colId xmlns:a16="http://schemas.microsoft.com/office/drawing/2014/main" val="1632794655"/>
-                    </a:ext>
-                  </a:extLst>
-                </a:gridCol>
-                <a:gridCol w="6296343">
-                  <a:extLst>
-                    <a:ext uri="{9D8B030D-6E8A-4147-A177-3AD203B41FA5}">
-                      <a16:colId xmlns:a16="http://schemas.microsoft.com/office/drawing/2014/main" val="2011313899"/>
-                    </a:ext>
-                  </a:extLst>
-                </a:gridCol>
-              </a:tblGrid>
-              <a:tr h="767632">
-                <a:tc gridSpan="2">
-                  <a:txBody>
-                    <a:bodyPr/>
-                    <a:lstStyle/>
-                    <a:p>
-                      <a:r>
-                        <a:rPr lang="en-US" sz="3600" dirty="0" smtClean="0">
-                          <a:latin typeface="Segoe UI Light" panose="020B0502040204020203" pitchFamily="34" charset="0"/>
-                          <a:cs typeface="Segoe UI Light" panose="020B0502040204020203" pitchFamily="34" charset="0"/>
-                        </a:rPr>
-                        <a:t>Creating Dynamic Webpages With Knockout</a:t>
-                      </a:r>
-                      <a:endParaRPr lang="en-US" sz="3600" dirty="0">
-                        <a:latin typeface="Segoe UI Light" panose="020B0502040204020203" pitchFamily="34" charset="0"/>
-                        <a:cs typeface="Segoe UI Light" panose="020B0502040204020203" pitchFamily="34" charset="0"/>
-                      </a:endParaRPr>
-                    </a:p>
-                  </a:txBody>
-                  <a:tcPr anchor="ctr"/>
-                </a:tc>
-                <a:tc hMerge="1">
-                  <a:txBody>
-                    <a:bodyPr/>
-                    <a:lstStyle/>
-                    <a:p>
-                      <a:endParaRPr lang="en-US" dirty="0"/>
-                    </a:p>
-                  </a:txBody>
-                  <a:tcPr/>
-                </a:tc>
-                <a:extLst>
-                  <a:ext uri="{0D108BD9-81ED-4DB2-BD59-A6C34878D82A}">
-                    <a16:rowId xmlns:a16="http://schemas.microsoft.com/office/drawing/2014/main" val="1789177411"/>
-                  </a:ext>
-                </a:extLst>
-              </a:tr>
-              <a:tr h="767632">
-                <a:tc>
-                  <a:txBody>
-                    <a:bodyPr/>
-                    <a:lstStyle/>
-                    <a:p>
-                      <a:r>
-                        <a:rPr lang="en-US" sz="2400" dirty="0" smtClean="0">
-                          <a:latin typeface="Segoe UI Light" panose="020B0502040204020203" pitchFamily="34" charset="0"/>
-                          <a:cs typeface="Segoe UI Light" panose="020B0502040204020203" pitchFamily="34" charset="0"/>
-                        </a:rPr>
-                        <a:t>01 | Introducing</a:t>
-                      </a:r>
-                      <a:r>
-                        <a:rPr lang="en-US" sz="2400" baseline="0" dirty="0" smtClean="0">
-                          <a:latin typeface="Segoe UI Light" panose="020B0502040204020203" pitchFamily="34" charset="0"/>
-                          <a:cs typeface="Segoe UI Light" panose="020B0502040204020203" pitchFamily="34" charset="0"/>
-                        </a:rPr>
-                        <a:t> Knockout</a:t>
-                      </a:r>
-                      <a:endParaRPr lang="en-US" sz="2400" dirty="0">
-                        <a:latin typeface="Segoe UI Light" panose="020B0502040204020203" pitchFamily="34" charset="0"/>
-                        <a:cs typeface="Segoe UI Light" panose="020B0502040204020203" pitchFamily="34" charset="0"/>
-                      </a:endParaRPr>
-                    </a:p>
-                  </a:txBody>
-                  <a:tcPr anchor="ctr"/>
-                </a:tc>
-                <a:tc>
-                  <a:txBody>
-                    <a:bodyPr/>
-                    <a:lstStyle/>
-                    <a:p>
-                      <a:r>
-                        <a:rPr lang="en-US" sz="2400" dirty="0" smtClean="0">
-                          <a:latin typeface="Segoe UI Light" panose="020B0502040204020203" pitchFamily="34" charset="0"/>
-                          <a:cs typeface="Segoe UI Light" panose="020B0502040204020203" pitchFamily="34" charset="0"/>
-                        </a:rPr>
-                        <a:t>04 | Making</a:t>
-                      </a:r>
-                      <a:r>
-                        <a:rPr lang="en-US" sz="2400" baseline="0" dirty="0" smtClean="0">
-                          <a:latin typeface="Segoe UI Light" panose="020B0502040204020203" pitchFamily="34" charset="0"/>
-                          <a:cs typeface="Segoe UI Light" panose="020B0502040204020203" pitchFamily="34" charset="0"/>
-                        </a:rPr>
-                        <a:t> Server Calls and Persisting Data</a:t>
-                      </a:r>
-                      <a:endParaRPr lang="en-US" sz="2400" dirty="0">
-                        <a:latin typeface="Segoe UI Light" panose="020B0502040204020203" pitchFamily="34" charset="0"/>
-                        <a:cs typeface="Segoe UI Light" panose="020B0502040204020203" pitchFamily="34" charset="0"/>
-                      </a:endParaRPr>
-                    </a:p>
-                  </a:txBody>
-                  <a:tcPr anchor="ctr"/>
-                </a:tc>
-                <a:extLst>
-                  <a:ext uri="{0D108BD9-81ED-4DB2-BD59-A6C34878D82A}">
-                    <a16:rowId xmlns:a16="http://schemas.microsoft.com/office/drawing/2014/main" val="3842815335"/>
-                  </a:ext>
-                </a:extLst>
-              </a:tr>
-              <a:tr h="767632">
-                <a:tc>
-                  <a:txBody>
-                    <a:bodyPr/>
-                    <a:lstStyle/>
-                    <a:p>
-                      <a:r>
-                        <a:rPr lang="en-US" sz="2400" dirty="0" smtClean="0">
-                          <a:latin typeface="Segoe UI Light" panose="020B0502040204020203" pitchFamily="34" charset="0"/>
-                          <a:cs typeface="Segoe UI Light" panose="020B0502040204020203" pitchFamily="34" charset="0"/>
-                        </a:rPr>
-                        <a:t>02 | Binding and Models</a:t>
-                      </a:r>
-                      <a:endParaRPr lang="en-US" sz="2400" dirty="0">
-                        <a:latin typeface="Segoe UI Light" panose="020B0502040204020203" pitchFamily="34" charset="0"/>
-                        <a:cs typeface="Segoe UI Light" panose="020B0502040204020203" pitchFamily="34" charset="0"/>
-                      </a:endParaRPr>
-                    </a:p>
-                  </a:txBody>
-                  <a:tcPr anchor="ctr"/>
-                </a:tc>
-                <a:tc>
-                  <a:txBody>
-                    <a:bodyPr/>
-                    <a:lstStyle/>
-                    <a:p>
-                      <a:r>
-                        <a:rPr lang="en-US" sz="2400" dirty="0" smtClean="0">
-                          <a:latin typeface="Segoe UI Light" panose="020B0502040204020203" pitchFamily="34" charset="0"/>
-                          <a:cs typeface="Segoe UI Light" panose="020B0502040204020203" pitchFamily="34" charset="0"/>
-                        </a:rPr>
-                        <a:t>05 | Bringing It All Together</a:t>
-                      </a:r>
-                      <a:endParaRPr lang="en-US" sz="2400" dirty="0">
-                        <a:latin typeface="Segoe UI Light" panose="020B0502040204020203" pitchFamily="34" charset="0"/>
-                        <a:cs typeface="Segoe UI Light" panose="020B0502040204020203" pitchFamily="34" charset="0"/>
-                      </a:endParaRPr>
-                    </a:p>
-                  </a:txBody>
-                  <a:tcPr anchor="ctr"/>
-                </a:tc>
-                <a:extLst>
-                  <a:ext uri="{0D108BD9-81ED-4DB2-BD59-A6C34878D82A}">
-                    <a16:rowId xmlns:a16="http://schemas.microsoft.com/office/drawing/2014/main" val="321066646"/>
-                  </a:ext>
-                </a:extLst>
-              </a:tr>
-              <a:tr h="767632">
-                <a:tc>
-                  <a:txBody>
-                    <a:bodyPr/>
-                    <a:lstStyle/>
-                    <a:p>
-                      <a:pPr marL="0" marR="0" indent="0" algn="l" defTabSz="914088" rtl="0" eaLnBrk="1" fontAlgn="auto" latinLnBrk="0" hangingPunct="1">
-                        <a:lnSpc>
-                          <a:spcPct val="100000"/>
-                        </a:lnSpc>
-                        <a:spcBef>
-                          <a:spcPts val="0"/>
-                        </a:spcBef>
-                        <a:spcAft>
-                          <a:spcPts val="0"/>
-                        </a:spcAft>
-                        <a:buClrTx/>
-                        <a:buSzTx/>
-                        <a:buFontTx/>
-                        <a:buNone/>
-                        <a:tabLst/>
-                        <a:defRPr/>
-                      </a:pPr>
-                      <a:r>
-                        <a:rPr lang="en-US" sz="2400" dirty="0" smtClean="0">
-                          <a:latin typeface="Segoe UI Light" panose="020B0502040204020203" pitchFamily="34" charset="0"/>
-                          <a:cs typeface="Segoe UI Light" panose="020B0502040204020203" pitchFamily="34" charset="0"/>
-                        </a:rPr>
-                        <a:t>03</a:t>
-                      </a:r>
-                      <a:r>
-                        <a:rPr lang="en-US" sz="2400" baseline="0" dirty="0" smtClean="0">
-                          <a:latin typeface="Segoe UI Light" panose="020B0502040204020203" pitchFamily="34" charset="0"/>
-                          <a:cs typeface="Segoe UI Light" panose="020B0502040204020203" pitchFamily="34" charset="0"/>
-                        </a:rPr>
-                        <a:t> | Loops, Logic and Templates</a:t>
-                      </a:r>
-                      <a:endParaRPr lang="en-US" sz="2400" dirty="0" smtClean="0">
-                        <a:latin typeface="Segoe UI Light" panose="020B0502040204020203" pitchFamily="34" charset="0"/>
-                        <a:cs typeface="Segoe UI Light" panose="020B0502040204020203" pitchFamily="34" charset="0"/>
-                      </a:endParaRPr>
-                    </a:p>
-                  </a:txBody>
-                  <a:tcPr anchor="ctr"/>
-                </a:tc>
-                <a:tc>
-                  <a:txBody>
-                    <a:bodyPr/>
-                    <a:lstStyle/>
-                    <a:p>
-                      <a:endParaRPr lang="en-US" sz="2400" dirty="0">
-                        <a:latin typeface="Segoe UI Light" panose="020B0502040204020203" pitchFamily="34" charset="0"/>
-                        <a:cs typeface="Segoe UI Light" panose="020B0502040204020203" pitchFamily="34" charset="0"/>
-                      </a:endParaRPr>
-                    </a:p>
-                  </a:txBody>
-                  <a:tcPr anchor="ctr"/>
-                </a:tc>
-                <a:extLst>
-                  <a:ext uri="{0D108BD9-81ED-4DB2-BD59-A6C34878D82A}">
-                    <a16:rowId xmlns:a16="http://schemas.microsoft.com/office/drawing/2014/main" val="3812060533"/>
-                  </a:ext>
-                </a:extLst>
-              </a:tr>
-            </a:tbl>
-          </a:graphicData>
-        </a:graphic>
-      </p:graphicFrame>
-    </p:spTree>
-    <p:extLst>
-      <p:ext uri="{BB962C8B-B14F-4D97-AF65-F5344CB8AC3E}">
-        <p14:creationId xmlns:p14="http://schemas.microsoft.com/office/powerpoint/2010/main" val="3101442689"/>
-      </p:ext>
-    </p:extLst>
-  </p:cSld>
-  <p:clrMapOvr>
-    <a:masterClrMapping/>
-  </p:clrMapOvr>
-  <mc:AlternateContent xmlns:mc="http://schemas.openxmlformats.org/markup-compatibility/2006" xmlns:p14="http://schemas.microsoft.com/office/powerpoint/2010/main">
-    <mc:Choice Requires="p14">
-      <p:transition spd="slow" p14:dur="2000"/>
-    </mc:Choice>
-    <mc:Fallback xmlns="">
-      <p:transition spd="slow"/>
-    </mc:Fallback>
-  </mc:AlternateContent>
-  <p:timing>
-    <p:tnLst>
-      <p:par>
-        <p:cTn id="1" dur="indefinite" restart="never" nodeType="tmRoot"/>
-      </p:par>
-    </p:tnLst>
-  </p:timing>
-</p:sld>
-</file>
-
 <file path=ppt/slides/slide3.xml><?xml version="1.0" encoding="utf-8"?>
 <p:sld xmlns:a="http://schemas.openxmlformats.org/drawingml/2006/main" xmlns:r="http://schemas.openxmlformats.org/officeDocument/2006/relationships" xmlns:p="http://schemas.openxmlformats.org/presentationml/2006/main">
   <p:cSld>
@@ -4378,7 +5314,7 @@
           <a:p>
             <a:r>
               <a:rPr lang="en-US" dirty="0" smtClean="0"/>
-              <a:t>Creating a Model</a:t>
+              <a:t>Creating a model</a:t>
             </a:r>
             <a:endParaRPr lang="en-US" dirty="0"/>
           </a:p>
@@ -4399,7 +5335,7 @@
           <a:bodyPr/>
           <a:lstStyle/>
           <a:p>
-            <a:endParaRPr lang="en-US"/>
+            <a:endParaRPr lang="en-US" dirty="0"/>
           </a:p>
         </p:txBody>
       </p:sp>
@@ -4442,7 +5378,7 @@
       </p:grpSpPr>
       <p:sp>
         <p:nvSpPr>
-          <p:cNvPr id="5" name="Title 4"/>
+          <p:cNvPr id="4" name="Title 3"/>
           <p:cNvSpPr>
             <a:spLocks noGrp="1"/>
           </p:cNvSpPr>
@@ -4456,30 +5392,99 @@
           <a:lstStyle/>
           <a:p>
             <a:r>
-              <a:rPr lang="en-CA" dirty="0" smtClean="0"/>
-              <a:t>Creating the model</a:t>
+              <a:rPr lang="en-US" dirty="0" smtClean="0"/>
+              <a:t>What’s a model?</a:t>
             </a:r>
             <a:endParaRPr lang="en-US" dirty="0"/>
           </a:p>
         </p:txBody>
       </p:sp>
+      <p:sp>
+        <p:nvSpPr>
+          <p:cNvPr id="5" name="Content Placeholder 4"/>
+          <p:cNvSpPr>
+            <a:spLocks noGrp="1"/>
+          </p:cNvSpPr>
+          <p:nvPr>
+            <p:ph sz="quarter" idx="10"/>
+          </p:nvPr>
+        </p:nvSpPr>
+        <p:spPr/>
+        <p:txBody>
+          <a:bodyPr/>
+          <a:lstStyle/>
+          <a:p>
+            <a:r>
+              <a:rPr lang="en-US" dirty="0" smtClean="0"/>
+              <a:t>A model is nothing more than a JavaScript class</a:t>
+            </a:r>
+          </a:p>
+        </p:txBody>
+      </p:sp>
+      <mc:AlternateContent xmlns:mc="http://schemas.openxmlformats.org/markup-compatibility/2006" xmlns:we="http://schemas.microsoft.com/office/webextensions/webextension/2010/11" xmlns:pca="http://schemas.microsoft.com/office/powerpoint/2013/contentapp">
+        <mc:Choice Requires="we pca">
+          <p:graphicFrame>
+            <p:nvGraphicFramePr>
+              <p:cNvPr id="6" name="Add-in 5" title="Code Presenter Pro"/>
+              <p:cNvGraphicFramePr>
+                <a:graphicFrameLocks noGrp="1"/>
+              </p:cNvGraphicFramePr>
+              <p:nvPr>
+                <p:extLst>
+                  <p:ext uri="{D42A27DB-BD31-4B8C-83A1-F6EECF244321}">
+                    <p14:modId xmlns:p14="http://schemas.microsoft.com/office/powerpoint/2010/main" val="3807418510"/>
+                  </p:ext>
+                </p:extLst>
+              </p:nvPr>
+            </p:nvGraphicFramePr>
+            <p:xfrm>
+              <a:off x="0" y="2097741"/>
+              <a:ext cx="12192000" cy="4760258"/>
+            </p:xfrm>
+            <a:graphic>
+              <a:graphicData uri="http://schemas.microsoft.com/office/webextensions/webextension/2010/11">
+                <we:webextensionref xmlns:we="http://schemas.microsoft.com/office/webextensions/webextension/2010/11" xmlns:r="http://schemas.openxmlformats.org/officeDocument/2006/relationships" r:id="rId2"/>
+              </a:graphicData>
+            </a:graphic>
+          </p:graphicFrame>
+        </mc:Choice>
+        <mc:Fallback xmlns="">
+          <p:pic>
+            <p:nvPicPr>
+              <p:cNvPr id="6" name="Add-in 5" title="Code Presenter Pro"/>
+              <p:cNvPicPr>
+                <a:picLocks noGrp="1" noRot="1" noChangeAspect="1" noMove="1" noResize="1" noEditPoints="1" noAdjustHandles="1" noChangeArrowheads="1" noChangeShapeType="1"/>
+              </p:cNvPicPr>
+              <p:nvPr/>
+            </p:nvPicPr>
+            <p:blipFill>
+              <a:blip r:embed="rId3"/>
+              <a:stretch>
+                <a:fillRect/>
+              </a:stretch>
+            </p:blipFill>
+            <p:spPr>
+              <a:xfrm>
+                <a:off x="0" y="2097741"/>
+                <a:ext cx="12192000" cy="4760258"/>
+              </a:xfrm>
+              <a:prstGeom prst="rect">
+                <a:avLst/>
+              </a:prstGeom>
+            </p:spPr>
+          </p:pic>
+        </mc:Fallback>
+      </mc:AlternateContent>
     </p:spTree>
     <p:extLst>
       <p:ext uri="{BB962C8B-B14F-4D97-AF65-F5344CB8AC3E}">
-        <p14:creationId xmlns:p14="http://schemas.microsoft.com/office/powerpoint/2010/main" val="757686776"/>
+        <p14:creationId xmlns:p14="http://schemas.microsoft.com/office/powerpoint/2010/main" val="3361869823"/>
       </p:ext>
     </p:extLst>
   </p:cSld>
   <p:clrMapOvr>
     <a:masterClrMapping/>
   </p:clrMapOvr>
-  <p:timing>
-    <p:tnLst>
-      <p:par>
-        <p:cTn id="1" dur="indefinite" restart="never" nodeType="tmRoot"/>
-      </p:par>
-    </p:tnLst>
-  </p:timing>
 </p:sld>
 </file>
 
@@ -4502,12 +5507,12 @@
       </p:grpSpPr>
       <p:sp>
         <p:nvSpPr>
-          <p:cNvPr id="2" name="Text Placeholder 1"/>
-          <p:cNvSpPr>
-            <a:spLocks noGrp="1"/>
-          </p:cNvSpPr>
-          <p:nvPr>
-            <p:ph type="body" sz="quarter" idx="10"/>
+          <p:cNvPr id="5" name="Title 4"/>
+          <p:cNvSpPr>
+            <a:spLocks noGrp="1"/>
+          </p:cNvSpPr>
+          <p:nvPr>
+            <p:ph type="title"/>
           </p:nvPr>
         </p:nvSpPr>
         <p:spPr/>
@@ -4516,36 +5521,17 @@
           <a:lstStyle/>
           <a:p>
             <a:r>
-              <a:rPr lang="en-US" dirty="0" smtClean="0"/>
-              <a:t>Computed Properties</a:t>
+              <a:rPr lang="en-CA" dirty="0" smtClean="0"/>
+              <a:t>Creating the model</a:t>
             </a:r>
             <a:endParaRPr lang="en-US" dirty="0"/>
-          </a:p>
-        </p:txBody>
-      </p:sp>
-      <p:sp>
-        <p:nvSpPr>
-          <p:cNvPr id="3" name="Subtitle 2"/>
-          <p:cNvSpPr>
-            <a:spLocks noGrp="1"/>
-          </p:cNvSpPr>
-          <p:nvPr>
-            <p:ph type="subTitle" idx="1"/>
-          </p:nvPr>
-        </p:nvSpPr>
-        <p:spPr/>
-        <p:txBody>
-          <a:bodyPr/>
-          <a:lstStyle/>
-          <a:p>
-            <a:endParaRPr lang="en-US"/>
           </a:p>
         </p:txBody>
       </p:sp>
     </p:spTree>
     <p:extLst>
       <p:ext uri="{BB962C8B-B14F-4D97-AF65-F5344CB8AC3E}">
-        <p14:creationId xmlns:p14="http://schemas.microsoft.com/office/powerpoint/2010/main" val="2875753425"/>
+        <p14:creationId xmlns:p14="http://schemas.microsoft.com/office/powerpoint/2010/main" val="757686776"/>
       </p:ext>
     </p:extLst>
   </p:cSld>
@@ -4581,12 +5567,12 @@
       </p:grpSpPr>
       <p:sp>
         <p:nvSpPr>
-          <p:cNvPr id="5" name="Title 4"/>
-          <p:cNvSpPr>
-            <a:spLocks noGrp="1"/>
-          </p:cNvSpPr>
-          <p:nvPr>
-            <p:ph type="title"/>
+          <p:cNvPr id="2" name="Text Placeholder 1"/>
+          <p:cNvSpPr>
+            <a:spLocks noGrp="1"/>
+          </p:cNvSpPr>
+          <p:nvPr>
+            <p:ph type="body" sz="quarter" idx="10"/>
           </p:nvPr>
         </p:nvSpPr>
         <p:spPr/>
@@ -4595,9 +5581,27 @@
           <a:lstStyle/>
           <a:p>
             <a:r>
-              <a:rPr lang="en-CA" dirty="0" smtClean="0"/>
-              <a:t>Computed Properties</a:t>
-            </a:r>
+              <a:rPr lang="en-US" dirty="0" smtClean="0"/>
+              <a:t>Binding concepts</a:t>
+            </a:r>
+          </a:p>
+        </p:txBody>
+      </p:sp>
+      <p:sp>
+        <p:nvSpPr>
+          <p:cNvPr id="3" name="Subtitle 2"/>
+          <p:cNvSpPr>
+            <a:spLocks noGrp="1"/>
+          </p:cNvSpPr>
+          <p:nvPr>
+            <p:ph type="subTitle" idx="1"/>
+          </p:nvPr>
+        </p:nvSpPr>
+        <p:spPr/>
+        <p:txBody>
+          <a:bodyPr/>
+          <a:lstStyle/>
+          <a:p>
             <a:endParaRPr lang="en-US" dirty="0"/>
           </a:p>
         </p:txBody>
@@ -4605,7 +5609,7 @@
     </p:spTree>
     <p:extLst>
       <p:ext uri="{BB962C8B-B14F-4D97-AF65-F5344CB8AC3E}">
-        <p14:creationId xmlns:p14="http://schemas.microsoft.com/office/powerpoint/2010/main" val="3787135604"/>
+        <p14:creationId xmlns:p14="http://schemas.microsoft.com/office/powerpoint/2010/main" val="3537461208"/>
       </p:ext>
     </p:extLst>
   </p:cSld>
@@ -4641,12 +5645,12 @@
       </p:grpSpPr>
       <p:sp>
         <p:nvSpPr>
-          <p:cNvPr id="2" name="Text Placeholder 1"/>
-          <p:cNvSpPr>
-            <a:spLocks noGrp="1"/>
-          </p:cNvSpPr>
-          <p:nvPr>
-            <p:ph type="body" sz="quarter" idx="10"/>
+          <p:cNvPr id="4" name="Title 3"/>
+          <p:cNvSpPr>
+            <a:spLocks noGrp="1"/>
+          </p:cNvSpPr>
+          <p:nvPr>
+            <p:ph type="title"/>
           </p:nvPr>
         </p:nvSpPr>
         <p:spPr/>
@@ -4656,19 +5660,20 @@
           <a:p>
             <a:r>
               <a:rPr lang="en-US" dirty="0" smtClean="0"/>
-              <a:t>Binding Concepts</a:t>
-            </a:r>
-          </a:p>
-        </p:txBody>
-      </p:sp>
-      <p:sp>
-        <p:nvSpPr>
-          <p:cNvPr id="3" name="Subtitle 2"/>
-          <p:cNvSpPr>
-            <a:spLocks noGrp="1"/>
-          </p:cNvSpPr>
-          <p:nvPr>
-            <p:ph type="subTitle" idx="1"/>
+              <a:t>The goal of Knockout is to ease data binding</a:t>
+            </a:r>
+            <a:endParaRPr lang="en-US" dirty="0"/>
+          </a:p>
+        </p:txBody>
+      </p:sp>
+      <p:sp>
+        <p:nvSpPr>
+          <p:cNvPr id="5" name="Content Placeholder 4"/>
+          <p:cNvSpPr>
+            <a:spLocks noGrp="1"/>
+          </p:cNvSpPr>
+          <p:nvPr>
+            <p:ph sz="quarter" idx="10"/>
           </p:nvPr>
         </p:nvSpPr>
         <p:spPr/>
@@ -4676,27 +5681,71 @@
           <a:bodyPr/>
           <a:lstStyle/>
           <a:p>
-            <a:endParaRPr lang="en-US"/>
+            <a:r>
+              <a:rPr lang="en-US" dirty="0" smtClean="0"/>
+              <a:t>You can bind pretty much any JavaScript object’s property to pretty much any property in HTML</a:t>
+            </a:r>
+          </a:p>
+          <a:p>
+            <a:endParaRPr lang="en-US" dirty="0"/>
+          </a:p>
+          <a:p>
+            <a:r>
+              <a:rPr lang="en-US" dirty="0" smtClean="0"/>
+              <a:t>Available bindings</a:t>
+            </a:r>
+          </a:p>
+          <a:p>
+            <a:pPr lvl="1"/>
+            <a:r>
+              <a:rPr lang="en-US" dirty="0" smtClean="0"/>
+              <a:t>value</a:t>
+            </a:r>
+          </a:p>
+          <a:p>
+            <a:pPr lvl="1"/>
+            <a:r>
+              <a:rPr lang="en-US" dirty="0" smtClean="0"/>
+              <a:t>text</a:t>
+            </a:r>
+          </a:p>
+          <a:p>
+            <a:pPr lvl="1"/>
+            <a:r>
+              <a:rPr lang="en-US" dirty="0" err="1" smtClean="0"/>
+              <a:t>css</a:t>
+            </a:r>
+            <a:r>
+              <a:rPr lang="en-US" dirty="0" smtClean="0"/>
+              <a:t> (for classes)</a:t>
+            </a:r>
+          </a:p>
+          <a:p>
+            <a:pPr lvl="1"/>
+            <a:r>
+              <a:rPr lang="en-US" dirty="0" smtClean="0"/>
+              <a:t>visible</a:t>
+            </a:r>
+          </a:p>
+          <a:p>
+            <a:pPr lvl="1"/>
+            <a:r>
+              <a:rPr lang="en-US" dirty="0" smtClean="0"/>
+              <a:t>disable or enable</a:t>
+            </a:r>
           </a:p>
         </p:txBody>
       </p:sp>
     </p:spTree>
     <p:extLst>
       <p:ext uri="{BB962C8B-B14F-4D97-AF65-F5344CB8AC3E}">
-        <p14:creationId xmlns:p14="http://schemas.microsoft.com/office/powerpoint/2010/main" val="3537461208"/>
+        <p14:creationId xmlns:p14="http://schemas.microsoft.com/office/powerpoint/2010/main" val="3435189681"/>
       </p:ext>
     </p:extLst>
   </p:cSld>
   <p:clrMapOvr>
     <a:masterClrMapping/>
   </p:clrMapOvr>
-  <p:timing>
-    <p:tnLst>
-      <p:par>
-        <p:cTn id="1" dur="indefinite" restart="never" nodeType="tmRoot"/>
-      </p:par>
-    </p:tnLst>
-  </p:timing>
 </p:sld>
 </file>
 
@@ -4719,7 +5768,7 @@
       </p:grpSpPr>
       <p:sp>
         <p:nvSpPr>
-          <p:cNvPr id="5" name="Title 4"/>
+          <p:cNvPr id="2" name="Title 1"/>
           <p:cNvSpPr>
             <a:spLocks noGrp="1"/>
           </p:cNvSpPr>
@@ -4733,8 +5782,90 @@
           <a:lstStyle/>
           <a:p>
             <a:r>
-              <a:rPr lang="en-CA" dirty="0" smtClean="0"/>
-              <a:t>Binding to a list</a:t>
+              <a:rPr lang="en-US" dirty="0" smtClean="0"/>
+              <a:t>Some binding keywords</a:t>
+            </a:r>
+            <a:endParaRPr lang="en-US" dirty="0"/>
+          </a:p>
+        </p:txBody>
+      </p:sp>
+      <p:sp>
+        <p:nvSpPr>
+          <p:cNvPr id="3" name="Content Placeholder 2"/>
+          <p:cNvSpPr>
+            <a:spLocks noGrp="1"/>
+          </p:cNvSpPr>
+          <p:nvPr>
+            <p:ph sz="quarter" idx="10"/>
+          </p:nvPr>
+        </p:nvSpPr>
+        <p:spPr/>
+        <p:txBody>
+          <a:bodyPr>
+            <a:normAutofit fontScale="92500" lnSpcReduction="10000"/>
+          </a:bodyPr>
+          <a:lstStyle/>
+          <a:p>
+            <a:r>
+              <a:rPr lang="en-US" dirty="0" smtClean="0"/>
+              <a:t>Typically Knockout will figure out where you are automatically</a:t>
+            </a:r>
+          </a:p>
+          <a:p>
+            <a:r>
+              <a:rPr lang="en-US" dirty="0" smtClean="0"/>
+              <a:t>But there be times when you need to explain to Knockout where a particular object or function is</a:t>
+            </a:r>
+          </a:p>
+          <a:p>
+            <a:endParaRPr lang="en-US" dirty="0"/>
+          </a:p>
+          <a:p>
+            <a:r>
+              <a:rPr lang="en-US" dirty="0" smtClean="0"/>
+              <a:t>Available keywords</a:t>
+            </a:r>
+          </a:p>
+          <a:p>
+            <a:pPr lvl="1"/>
+            <a:r>
+              <a:rPr lang="en-US" dirty="0" smtClean="0"/>
+              <a:t>$data</a:t>
+            </a:r>
+          </a:p>
+          <a:p>
+            <a:pPr lvl="2"/>
+            <a:r>
+              <a:rPr lang="en-US" dirty="0" smtClean="0"/>
+              <a:t>Current object</a:t>
+            </a:r>
+          </a:p>
+          <a:p>
+            <a:pPr lvl="1"/>
+            <a:r>
+              <a:rPr lang="en-US" dirty="0" smtClean="0"/>
+              <a:t>$parent</a:t>
+            </a:r>
+          </a:p>
+          <a:p>
+            <a:pPr lvl="2"/>
+            <a:r>
+              <a:rPr lang="en-US" dirty="0" smtClean="0"/>
+              <a:t>Parent of the current object</a:t>
+            </a:r>
+          </a:p>
+          <a:p>
+            <a:pPr lvl="1"/>
+            <a:r>
+              <a:rPr lang="en-US" dirty="0" smtClean="0"/>
+              <a:t>$root</a:t>
+            </a:r>
+          </a:p>
+          <a:p>
+            <a:pPr lvl="2"/>
+            <a:r>
+              <a:rPr lang="en-US" dirty="0" smtClean="0"/>
+              <a:t>Bound view model</a:t>
             </a:r>
             <a:endParaRPr lang="en-US" dirty="0"/>
           </a:p>
@@ -4743,20 +5874,13 @@
     </p:spTree>
     <p:extLst>
       <p:ext uri="{BB962C8B-B14F-4D97-AF65-F5344CB8AC3E}">
-        <p14:creationId xmlns:p14="http://schemas.microsoft.com/office/powerpoint/2010/main" val="3065726087"/>
+        <p14:creationId xmlns:p14="http://schemas.microsoft.com/office/powerpoint/2010/main" val="2105807760"/>
       </p:ext>
     </p:extLst>
   </p:cSld>
   <p:clrMapOvr>
     <a:masterClrMapping/>
   </p:clrMapOvr>
-  <p:timing>
-    <p:tnLst>
-      <p:par>
-        <p:cTn id="1" dur="indefinite" restart="never" nodeType="tmRoot"/>
-      </p:par>
-    </p:tnLst>
-  </p:timing>
 </p:sld>
 </file>
 
@@ -4779,12 +5903,12 @@
       </p:grpSpPr>
       <p:sp>
         <p:nvSpPr>
-          <p:cNvPr id="2" name="Text Placeholder 1"/>
-          <p:cNvSpPr>
-            <a:spLocks noGrp="1"/>
-          </p:cNvSpPr>
-          <p:nvPr>
-            <p:ph type="body" sz="quarter" idx="10"/>
+          <p:cNvPr id="4" name="Title 3"/>
+          <p:cNvSpPr>
+            <a:spLocks noGrp="1"/>
+          </p:cNvSpPr>
+          <p:nvPr>
+            <p:ph type="title"/>
           </p:nvPr>
         </p:nvSpPr>
         <p:spPr/>
@@ -4794,47 +5918,22 @@
           <a:p>
             <a:r>
               <a:rPr lang="en-US" dirty="0" smtClean="0"/>
-              <a:t>Two-way Bindings</a:t>
-            </a:r>
-          </a:p>
-        </p:txBody>
-      </p:sp>
-      <p:sp>
-        <p:nvSpPr>
-          <p:cNvPr id="3" name="Subtitle 2"/>
-          <p:cNvSpPr>
-            <a:spLocks noGrp="1"/>
-          </p:cNvSpPr>
-          <p:nvPr>
-            <p:ph type="subTitle" idx="1"/>
-          </p:nvPr>
-        </p:nvSpPr>
-        <p:spPr/>
-        <p:txBody>
-          <a:bodyPr/>
-          <a:lstStyle/>
-          <a:p>
-            <a:endParaRPr lang="en-US"/>
+              <a:t>Our first binding</a:t>
+            </a:r>
+            <a:endParaRPr lang="en-US" dirty="0"/>
           </a:p>
         </p:txBody>
       </p:sp>
     </p:spTree>
     <p:extLst>
       <p:ext uri="{BB962C8B-B14F-4D97-AF65-F5344CB8AC3E}">
-        <p14:creationId xmlns:p14="http://schemas.microsoft.com/office/powerpoint/2010/main" val="3706342784"/>
+        <p14:creationId xmlns:p14="http://schemas.microsoft.com/office/powerpoint/2010/main" val="3366847130"/>
       </p:ext>
     </p:extLst>
   </p:cSld>
   <p:clrMapOvr>
     <a:masterClrMapping/>
   </p:clrMapOvr>
-  <p:timing>
-    <p:tnLst>
-      <p:par>
-        <p:cTn id="1" dur="indefinite" restart="never" nodeType="tmRoot"/>
-      </p:par>
-    </p:tnLst>
-  </p:timing>
 </p:sld>
 </file>
 
@@ -5387,4 +6486,74 @@
     </a:ext>
   </a:extLst>
 </a:theme>
+</file>
+
+<file path=ppt/webextensions/webextension1.xml><?xml version="1.0" encoding="utf-8"?>
+<we:webextension xmlns:we="http://schemas.microsoft.com/office/webextensions/webextension/2010/11" id="{457EB565-E68F-494C-9801-67A711ED9353}">
+  <we:reference id="wa104379263" version="1.0.0.0" store="en-US" storeType="OMEX"/>
+  <we:alternateReferences>
+    <we:reference id="WA104379263" version="1.0.0.0" store="WA104379263" storeType="OMEX"/>
+  </we:alternateReferences>
+  <we:properties>
+    <we:property name="config" value="{&quot;display_lang&quot;:&quot;en&quot;,&quot;display_font&quot;:&quot;Consolas&quot;,&quot;syntax_color&quot;:{&quot;Reserved words&quot;:&quot;#0000ff&quot;,&quot;Built-in objects&quot;:&quot;#FF0000&quot;,&quot;Line comment&quot;:&quot;#008000&quot;,&quot;Block comment&quot;:&quot;#008000&quot;,&quot;Quotation&quot;:&quot;#FF00FF&quot;,&quot;Quotation 2&quot;:&quot;#FF00FF&quot;,&quot;Number&quot;:&quot;#800080&quot;},&quot;old_syntax_color&quot;:{&quot;Reserved words&quot;:&quot;#0000FF&quot;,&quot;Built-in objects&quot;:&quot;#FF0000&quot;,&quot;Line comment&quot;:&quot;#008000&quot;,&quot;Block comment&quot;:&quot;#008000&quot;,&quot;Quotation&quot;:&quot;#FF00FF&quot;,&quot;Quotation 2&quot;:&quot;#FF00FF&quot;,&quot;Number&quot;:&quot;#800080&quot;},&quot;show_line_number&quot;:true,&quot;code_lang&quot;:&quot;js&quot;,&quot;code&quot;:&quot;var Developer = function() {\n    this.firstName = '';\n    this.lastName = '';\n    this.fullName = function() { return firstName + ' ' + lastName; };\n}\n\nvar Bug = function() {\n    this.description = '';\n    this.status = '';\n    this.assignedTo = null;\n    this.dateClosed = null;\n}\n\nvar Project = function() {\n    this.name = '';\n    this.bugs = new Array();\n}&quot;,&quot;ctags&quot;:{&quot;Bug&quot;:[{&quot;linenum&quot;:&quot;7&quot;,&quot;signature&quot;:&quot;var Bug = function() {&quot;}],&quot;Developer&quot;:[{&quot;linenum&quot;:&quot;1&quot;,&quot;signature&quot;:&quot;var Developer = function() {&quot;}],&quot;Project&quot;:[{&quot;linenum&quot;:&quot;14&quot;,&quot;signature&quot;:&quot;var Project = function() {&quot;}],&quot;fullName&quot;:[{&quot;linenum&quot;:&quot;4&quot;,&quot;signature&quot;:&quot;Developer::fullName&quot;}]}}"/>
+  </we:properties>
+  <we:bindings/>
+  <we:snapshot xmlns:r="http://schemas.openxmlformats.org/officeDocument/2006/relationships" r:embed="rId1"/>
+</we:webextension>
+</file>
+
+<file path=ppt/webextensions/webextension2.xml><?xml version="1.0" encoding="utf-8"?>
+<we:webextension xmlns:we="http://schemas.microsoft.com/office/webextensions/webextension/2010/11" id="{DD750CD0-1C67-417C-98CB-CDE1E7CD364B}">
+  <we:reference id="wa104379263" version="1.0.0.0" store="en-US" storeType="OMEX"/>
+  <we:alternateReferences>
+    <we:reference id="wa104379263" version="1.0.0.0" store="wa104379263" storeType="OMEX"/>
+  </we:alternateReferences>
+  <we:properties>
+    <we:property name="config" value="{&quot;display_lang&quot;:&quot;en&quot;,&quot;display_font&quot;:&quot;Consolas&quot;,&quot;syntax_color&quot;:{&quot;Reserved words&quot;:&quot;#0000ff&quot;,&quot;Built-in objects&quot;:&quot;#FF0000&quot;,&quot;Line comment&quot;:&quot;#008000&quot;,&quot;Block comment&quot;:&quot;#008000&quot;,&quot;Quotation&quot;:&quot;#FF00FF&quot;,&quot;Quotation 2&quot;:&quot;#FF00FF&quot;,&quot;Number&quot;:&quot;#800080&quot;},&quot;old_syntax_color&quot;:{&quot;Reserved words&quot;:&quot;#0000FF&quot;,&quot;Built-in objects&quot;:&quot;#FF0000&quot;,&quot;Line comment&quot;:&quot;#008000&quot;,&quot;Block comment&quot;:&quot;#008000&quot;,&quot;Quotation&quot;:&quot;#FF00FF&quot;,&quot;Quotation 2&quot;:&quot;#FF00FF&quot;,&quot;Number&quot;:&quot;#800080&quot;},&quot;show_line_number&quot;:true,&quot;code_lang&quot;:&quot;js&quot;,&quot;code&quot;:&quot;var Developer = function(firstName, lastName) {\n    this.firstName = ko.observable(firstName);\n    this.lastName = ko.observable(lastName);\n}&quot;,&quot;ctags&quot;:{&quot;Developer&quot;:[{&quot;linenum&quot;:&quot;1&quot;,&quot;signature&quot;:&quot;var Developer = function(firstName, lastName) {&quot;}]}}"/>
+  </we:properties>
+  <we:bindings/>
+  <we:snapshot xmlns:r="http://schemas.openxmlformats.org/officeDocument/2006/relationships" r:embed="rId1"/>
+</we:webextension>
+</file>
+
+<file path=ppt/webextensions/webextension3.xml><?xml version="1.0" encoding="utf-8"?>
+<we:webextension xmlns:we="http://schemas.microsoft.com/office/webextensions/webextension/2010/11" id="{CC3D9B75-689C-4E94-9FA2-D56983C5010D}">
+  <we:reference id="wa104379263" version="1.0.0.0" store="en-US" storeType="OMEX"/>
+  <we:alternateReferences>
+    <we:reference id="wa104379263" version="1.0.0.0" store="wa104379263" storeType="OMEX"/>
+  </we:alternateReferences>
+  <we:properties>
+    <we:property name="config" value="{&quot;display_lang&quot;:&quot;en&quot;,&quot;display_font&quot;:&quot;Consolas&quot;,&quot;syntax_color&quot;:{&quot;Reserved words&quot;:&quot;#0000ff&quot;,&quot;Built-in objects&quot;:&quot;#FF0000&quot;,&quot;Line comment&quot;:&quot;#008000&quot;,&quot;Block comment&quot;:&quot;#008000&quot;,&quot;Quotation&quot;:&quot;#FF00FF&quot;,&quot;Quotation 2&quot;:&quot;#FF00FF&quot;,&quot;Number&quot;:&quot;#800080&quot;},&quot;old_syntax_color&quot;:{&quot;Reserved words&quot;:&quot;#0000FF&quot;,&quot;Built-in objects&quot;:&quot;#FF0000&quot;,&quot;Line comment&quot;:&quot;#008000&quot;,&quot;Block comment&quot;:&quot;#008000&quot;,&quot;Quotation&quot;:&quot;#FF00FF&quot;,&quot;Quotation 2&quot;:&quot;#FF00FF&quot;,&quot;Number&quot;:&quot;#800080&quot;},&quot;show_line_number&quot;:true,&quot;code_lang&quot;:&quot;js&quot;,&quot;code&quot;:&quot;var Developer = function (first, last) {\n    this.firstName = ko.observable(first);\n    this.lastName = ko.observable(last);\n\n    this.fullName = ko.pureComputed(function () {\n        return this.firstName + ' ' + this.lastName;\n    }, this);\n};&quot;,&quot;ctags&quot;:{&quot;Developer&quot;:[{&quot;linenum&quot;:&quot;1&quot;,&quot;signature&quot;:&quot;var Developer = function (first, last) {&quot;}]}}"/>
+  </we:properties>
+  <we:bindings/>
+  <we:snapshot xmlns:r="http://schemas.openxmlformats.org/officeDocument/2006/relationships" r:embed="rId1"/>
+</we:webextension>
+</file>
+
+<file path=ppt/webextensions/webextension4.xml><?xml version="1.0" encoding="utf-8"?>
+<we:webextension xmlns:we="http://schemas.microsoft.com/office/webextensions/webextension/2010/11" id="{6A9C9C4C-B01E-44AE-82BB-F64BCD001AEB}">
+  <we:reference id="wa104379263" version="1.0.0.0" store="en-US" storeType="OMEX"/>
+  <we:alternateReferences>
+    <we:reference id="wa104379263" version="1.0.0.0" store="wa104379263" storeType="OMEX"/>
+  </we:alternateReferences>
+  <we:properties>
+    <we:property name="config" value="{&quot;display_lang&quot;:&quot;en&quot;,&quot;display_font&quot;:&quot;Consolas&quot;,&quot;syntax_color&quot;:{&quot;Reserved words&quot;:&quot;#0000ff&quot;,&quot;Built-in objects&quot;:&quot;#FF0000&quot;,&quot;Line comment&quot;:&quot;#008000&quot;,&quot;Block comment&quot;:&quot;#008000&quot;,&quot;Quotation&quot;:&quot;#FF00FF&quot;,&quot;Quotation 2&quot;:&quot;#FF00FF&quot;,&quot;Number&quot;:&quot;#800080&quot;},&quot;old_syntax_color&quot;:{&quot;Reserved words&quot;:&quot;#0000FF&quot;,&quot;Built-in objects&quot;:&quot;#FF0000&quot;,&quot;Line comment&quot;:&quot;#008000&quot;,&quot;Block comment&quot;:&quot;#008000&quot;,&quot;Quotation&quot;:&quot;#FF00FF&quot;,&quot;Quotation 2&quot;:&quot;#FF00FF&quot;,&quot;Number&quot;:&quot;#800080&quot;},&quot;show_line_number&quot;:true,&quot;code_lang&quot;:&quot;js&quot;,&quot;code&quot;:&quot;var Developer = function (first, last) {\n    var self = this;\n\n    self.firstName = ko.observable(first);\n    self.lastName = ko.observable(last);\n\n    self.fullName = ko.pureComputed(function () {\n        return self.firstName + ' ' + self.lastName;\n    });\n};&quot;,&quot;ctags&quot;:{&quot;Developer&quot;:[{&quot;linenum&quot;:&quot;1&quot;,&quot;signature&quot;:&quot;var Developer = function (first, last) {&quot;}]}}"/>
+  </we:properties>
+  <we:bindings/>
+  <we:snapshot xmlns:r="http://schemas.openxmlformats.org/officeDocument/2006/relationships" r:embed="rId1"/>
+</we:webextension>
+</file>
+
+<file path=ppt/webextensions/webextension5.xml><?xml version="1.0" encoding="utf-8"?>
+<we:webextension xmlns:we="http://schemas.microsoft.com/office/webextensions/webextension/2010/11" id="{0DD135D1-0D4D-4EE5-8E8A-2C0D2E19BE77}">
+  <we:reference id="wa104379263" version="1.0.0.0" store="en-US" storeType="OMEX"/>
+  <we:alternateReferences>
+    <we:reference id="wa104379263" version="1.0.0.0" store="wa104379263" storeType="OMEX"/>
+  </we:alternateReferences>
+  <we:properties>
+    <we:property name="config" value="{&quot;display_lang&quot;:&quot;en&quot;,&quot;display_font&quot;:&quot;Consolas&quot;,&quot;syntax_color&quot;:{&quot;Reserved words&quot;:&quot;#0000ff&quot;,&quot;Built-in objects&quot;:&quot;#FF0000&quot;,&quot;Line comment&quot;:&quot;#008000&quot;,&quot;Block comment&quot;:&quot;#008000&quot;,&quot;Quotation&quot;:&quot;#FF00FF&quot;,&quot;Quotation 2&quot;:&quot;#FF00FF&quot;,&quot;Number&quot;:&quot;#800080&quot;},&quot;old_syntax_color&quot;:{&quot;Reserved words&quot;:&quot;#0000FF&quot;,&quot;Built-in objects&quot;:&quot;#FF0000&quot;,&quot;Line comment&quot;:&quot;#008000&quot;,&quot;Block comment&quot;:&quot;#008000&quot;,&quot;Quotation&quot;:&quot;#FF00FF&quot;,&quot;Quotation 2&quot;:&quot;#FF00FF&quot;,&quot;Number&quot;:&quot;#800080&quot;},&quot;show_line_number&quot;:true,&quot;code_lang&quot;:&quot;js&quot;,&quot;code&quot;:&quot;var Developer = function (first, last) {\n    var self = this;\n\n    self.firstName = ko.observable(first);\n    self.lastName = ko.observable(last);\n\n    self.fullName = ko.pureComputed(function () {\n        return self.firstName() + ' ' + self.lastName();\n    });\n};\n&quot;,&quot;ctags&quot;:{&quot;Developer&quot;:[{&quot;linenum&quot;:&quot;1&quot;,&quot;signature&quot;:&quot;var Developer = function (first, last) {&quot;}]}}"/>
+  </we:properties>
+  <we:bindings/>
+  <we:snapshot xmlns:r="http://schemas.openxmlformats.org/officeDocument/2006/relationships" r:embed="rId1"/>
+</we:webextension>
 </file>
</xml_diff>

<commit_message>
Created Mod 3 content
</commit_message>
<xml_diff>
--- a/Slides/2 - Binding and Models.pptx
+++ b/Slides/2 - Binding and Models.pptx
@@ -3614,8 +3614,8 @@
           </a:p>
         </p:txBody>
       </p:sp>
-      <mc:AlternateContent xmlns:mc="http://schemas.openxmlformats.org/markup-compatibility/2006" xmlns:we="http://schemas.microsoft.com/office/webextensions/webextension/2010/11" xmlns:pca="http://schemas.microsoft.com/office/powerpoint/2013/contentapp">
-        <mc:Choice Requires="we pca">
+      <mc:AlternateContent xmlns:mc="http://schemas.openxmlformats.org/markup-compatibility/2006">
+        <mc:Choice xmlns:we="http://schemas.microsoft.com/office/webextensions/webextension/2010/11" xmlns:pca="http://schemas.microsoft.com/office/powerpoint/2013/contentapp" Requires="we pca">
           <p:graphicFrame>
             <p:nvGraphicFramePr>
               <p:cNvPr id="6" name="Add-in 5" title="Code Presenter Pro"/>
@@ -3641,7 +3641,7 @@
             </a:graphic>
           </p:graphicFrame>
         </mc:Choice>
-        <mc:Fallback xmlns="">
+        <mc:Fallback>
           <p:pic>
             <p:nvPicPr>
               <p:cNvPr id="6" name="Add-in 5" title="Code Presenter Pro"/>
@@ -4434,8 +4434,8 @@
           </a:p>
         </p:txBody>
       </p:sp>
-      <mc:AlternateContent xmlns:mc="http://schemas.openxmlformats.org/markup-compatibility/2006" xmlns:we="http://schemas.microsoft.com/office/webextensions/webextension/2010/11" xmlns:pca="http://schemas.microsoft.com/office/powerpoint/2013/contentapp">
-        <mc:Choice Requires="we pca">
+      <mc:AlternateContent xmlns:mc="http://schemas.openxmlformats.org/markup-compatibility/2006">
+        <mc:Choice xmlns:we="http://schemas.microsoft.com/office/webextensions/webextension/2010/11" xmlns:pca="http://schemas.microsoft.com/office/powerpoint/2013/contentapp" Requires="we pca">
           <p:graphicFrame>
             <p:nvGraphicFramePr>
               <p:cNvPr id="4" name="Add-in 3" title="Code Presenter Pro"/>
@@ -4461,7 +4461,7 @@
             </a:graphic>
           </p:graphicFrame>
         </mc:Choice>
-        <mc:Fallback xmlns="">
+        <mc:Fallback>
           <p:pic>
             <p:nvPicPr>
               <p:cNvPr id="4" name="Add-in 3" title="Code Presenter Pro"/>
@@ -5421,8 +5421,8 @@
           </a:p>
         </p:txBody>
       </p:sp>
-      <mc:AlternateContent xmlns:mc="http://schemas.openxmlformats.org/markup-compatibility/2006" xmlns:we="http://schemas.microsoft.com/office/webextensions/webextension/2010/11" xmlns:pca="http://schemas.microsoft.com/office/powerpoint/2013/contentapp">
-        <mc:Choice Requires="we pca">
+      <mc:AlternateContent xmlns:mc="http://schemas.openxmlformats.org/markup-compatibility/2006">
+        <mc:Choice xmlns:we="http://schemas.microsoft.com/office/webextensions/webextension/2010/11" xmlns:pca="http://schemas.microsoft.com/office/powerpoint/2013/contentapp" Requires="we pca">
           <p:graphicFrame>
             <p:nvGraphicFramePr>
               <p:cNvPr id="6" name="Add-in 5" title="Code Presenter Pro"/>
@@ -5448,7 +5448,7 @@
             </a:graphic>
           </p:graphicFrame>
         </mc:Choice>
-        <mc:Fallback xmlns="">
+        <mc:Fallback>
           <p:pic>
             <p:nvPicPr>
               <p:cNvPr id="6" name="Add-in 5" title="Code Presenter Pro"/>

</xml_diff>